<commit_message>
Updated the talk slides.
</commit_message>
<xml_diff>
--- a/presentations/2021_cedar_shumko_asilib.pptx
+++ b/presentations/2021_cedar_shumko_asilib.pptx
@@ -5,16 +5,19 @@
     <p:sldMasterId id="2147483648" r:id="rId1"/>
   </p:sldMasterIdLst>
   <p:notesMasterIdLst>
-    <p:notesMasterId r:id="rId9"/>
+    <p:notesMasterId r:id="rId12"/>
   </p:notesMasterIdLst>
   <p:sldIdLst>
     <p:sldId id="258" r:id="rId2"/>
     <p:sldId id="261" r:id="rId3"/>
     <p:sldId id="262" r:id="rId4"/>
-    <p:sldId id="259" r:id="rId5"/>
-    <p:sldId id="260" r:id="rId6"/>
-    <p:sldId id="257" r:id="rId7"/>
-    <p:sldId id="263" r:id="rId8"/>
+    <p:sldId id="264" r:id="rId5"/>
+    <p:sldId id="259" r:id="rId6"/>
+    <p:sldId id="265" r:id="rId7"/>
+    <p:sldId id="267" r:id="rId8"/>
+    <p:sldId id="268" r:id="rId9"/>
+    <p:sldId id="266" r:id="rId10"/>
+    <p:sldId id="263" r:id="rId11"/>
   </p:sldIdLst>
   <p:sldSz cx="12192000" cy="6858000"/>
   <p:notesSz cx="6858000" cy="9144000"/>
@@ -3732,7 +3735,7 @@
           <a:p>
             <a:r>
               <a:rPr lang="en-US" dirty="0"/>
-              <a:t>Mykhaylo Shumko, Bea Gallardo-Lacourt, Isaac Thompson, Alexa Halford, and Kyle Murphy</a:t>
+              <a:t>Mykhaylo (Mike) Shumko, Bea Gallardo-Lacourt, Isaac Thompson, Alexa Halford, and Kyle Murphy</a:t>
             </a:r>
           </a:p>
         </p:txBody>
@@ -3798,7 +3801,7 @@
             <a:pPr algn="ctr"/>
             <a:r>
               <a:rPr lang="en-US" sz="3600" dirty="0"/>
-              <a:t>Easily download, plot, animate, and analyze auroral all sky imager (ASI) data.</a:t>
+              <a:t>Easily download, plot, animate, and analyze auroral all sky imager (ASI) data</a:t>
             </a:r>
           </a:p>
         </p:txBody>
@@ -3905,6 +3908,264 @@
     <p:extLst>
       <p:ext uri="{BB962C8B-B14F-4D97-AF65-F5344CB8AC3E}">
         <p14:creationId xmlns:p14="http://schemas.microsoft.com/office/powerpoint/2010/main" val="1809867865"/>
+      </p:ext>
+    </p:extLst>
+  </p:cSld>
+  <p:clrMapOvr>
+    <a:masterClrMapping/>
+  </p:clrMapOvr>
+</p:sld>
+</file>
+
+<file path=ppt/slides/slide10.xml><?xml version="1.0" encoding="utf-8"?>
+<p:sld xmlns:a="http://schemas.openxmlformats.org/drawingml/2006/main" xmlns:r="http://schemas.openxmlformats.org/officeDocument/2006/relationships" xmlns:p="http://schemas.openxmlformats.org/presentationml/2006/main">
+  <p:cSld>
+    <p:spTree>
+      <p:nvGrpSpPr>
+        <p:cNvPr id="1" name=""/>
+        <p:cNvGrpSpPr/>
+        <p:nvPr/>
+      </p:nvGrpSpPr>
+      <p:grpSpPr>
+        <a:xfrm>
+          <a:off x="0" y="0"/>
+          <a:ext cx="0" cy="0"/>
+          <a:chOff x="0" y="0"/>
+          <a:chExt cx="0" cy="0"/>
+        </a:xfrm>
+      </p:grpSpPr>
+      <p:sp>
+        <p:nvSpPr>
+          <p:cNvPr id="2" name="Title 1">
+            <a:extLst>
+              <a:ext uri="{FF2B5EF4-FFF2-40B4-BE49-F238E27FC236}">
+                <a16:creationId xmlns:a16="http://schemas.microsoft.com/office/drawing/2014/main" id="{2A45E70C-41F0-F446-981F-6874DAC75985}"/>
+              </a:ext>
+            </a:extLst>
+          </p:cNvPr>
+          <p:cNvSpPr>
+            <a:spLocks noGrp="1"/>
+          </p:cNvSpPr>
+          <p:nvPr>
+            <p:ph type="title"/>
+          </p:nvPr>
+        </p:nvSpPr>
+        <p:spPr/>
+        <p:txBody>
+          <a:bodyPr/>
+          <a:lstStyle/>
+          <a:p>
+            <a:r>
+              <a:rPr lang="en-US" dirty="0"/>
+              <a:t>How to get started</a:t>
+            </a:r>
+          </a:p>
+        </p:txBody>
+      </p:sp>
+      <p:sp>
+        <p:nvSpPr>
+          <p:cNvPr id="3" name="Content Placeholder 2">
+            <a:extLst>
+              <a:ext uri="{FF2B5EF4-FFF2-40B4-BE49-F238E27FC236}">
+                <a16:creationId xmlns:a16="http://schemas.microsoft.com/office/drawing/2014/main" id="{887AE6D0-A308-AA43-8518-FF9E9CC1E300}"/>
+              </a:ext>
+            </a:extLst>
+          </p:cNvPr>
+          <p:cNvSpPr>
+            <a:spLocks noGrp="1"/>
+          </p:cNvSpPr>
+          <p:nvPr>
+            <p:ph idx="1"/>
+          </p:nvPr>
+        </p:nvSpPr>
+        <p:spPr>
+          <a:xfrm>
+            <a:off x="516194" y="1825625"/>
+            <a:ext cx="10837606" cy="4351338"/>
+          </a:xfrm>
+        </p:spPr>
+        <p:txBody>
+          <a:bodyPr/>
+          <a:lstStyle/>
+          <a:p>
+            <a:pPr marL="0" indent="0">
+              <a:buNone/>
+            </a:pPr>
+            <a:r>
+              <a:rPr lang="en-US" dirty="0"/>
+              <a:t>python3 –m pip install aurora-</a:t>
+            </a:r>
+            <a:r>
+              <a:rPr lang="en-US" dirty="0" err="1"/>
+              <a:t>asi</a:t>
+            </a:r>
+            <a:r>
+              <a:rPr lang="en-US" dirty="0"/>
+              <a:t>-lib (import as </a:t>
+            </a:r>
+            <a:r>
+              <a:rPr lang="en-US" dirty="0" err="1"/>
+              <a:t>asilib</a:t>
+            </a:r>
+            <a:r>
+              <a:rPr lang="en-US" dirty="0"/>
+              <a:t>)</a:t>
+            </a:r>
+          </a:p>
+          <a:p>
+            <a:pPr marL="0" indent="0">
+              <a:buNone/>
+            </a:pPr>
+            <a:endParaRPr lang="en-US" dirty="0"/>
+          </a:p>
+          <a:p>
+            <a:pPr marL="0" indent="0">
+              <a:buNone/>
+            </a:pPr>
+            <a:r>
+              <a:rPr lang="en-US" b="1" dirty="0"/>
+              <a:t>Documentation</a:t>
+            </a:r>
+            <a:r>
+              <a:rPr lang="en-US" dirty="0"/>
+              <a:t>: </a:t>
+            </a:r>
+            <a:r>
+              <a:rPr lang="en-US" dirty="0">
+                <a:hlinkClick r:id="rId2"/>
+              </a:rPr>
+              <a:t>https://aurora-asi-lib.readthedocs.io</a:t>
+            </a:r>
+            <a:endParaRPr lang="en-US" dirty="0"/>
+          </a:p>
+          <a:p>
+            <a:pPr marL="0" indent="0">
+              <a:buNone/>
+            </a:pPr>
+            <a:r>
+              <a:rPr lang="en-US" b="1" dirty="0"/>
+              <a:t>Code</a:t>
+            </a:r>
+            <a:r>
+              <a:rPr lang="en-US" dirty="0"/>
+              <a:t>: </a:t>
+            </a:r>
+            <a:r>
+              <a:rPr lang="en-US" dirty="0">
+                <a:hlinkClick r:id="rId3"/>
+              </a:rPr>
+              <a:t>https://github.com/mshumko/aurora-asi-lib</a:t>
+            </a:r>
+            <a:endParaRPr lang="en-US" dirty="0"/>
+          </a:p>
+          <a:p>
+            <a:endParaRPr lang="en-US" dirty="0"/>
+          </a:p>
+          <a:p>
+            <a:pPr marL="0" indent="0">
+              <a:buNone/>
+            </a:pPr>
+            <a:r>
+              <a:rPr lang="en-US" dirty="0"/>
+              <a:t>Thank you </a:t>
+            </a:r>
+            <a:r>
+              <a:rPr lang="en-US"/>
+              <a:t>for listening!</a:t>
+            </a:r>
+            <a:endParaRPr lang="en-US" dirty="0"/>
+          </a:p>
+        </p:txBody>
+      </p:sp>
+      <p:sp>
+        <p:nvSpPr>
+          <p:cNvPr id="4" name="Date Placeholder 3">
+            <a:extLst>
+              <a:ext uri="{FF2B5EF4-FFF2-40B4-BE49-F238E27FC236}">
+                <a16:creationId xmlns:a16="http://schemas.microsoft.com/office/drawing/2014/main" id="{926E3BE2-876A-4B47-9593-BD77AA131C7E}"/>
+              </a:ext>
+            </a:extLst>
+          </p:cNvPr>
+          <p:cNvSpPr>
+            <a:spLocks noGrp="1"/>
+          </p:cNvSpPr>
+          <p:nvPr>
+            <p:ph type="dt" sz="half" idx="10"/>
+          </p:nvPr>
+        </p:nvSpPr>
+        <p:spPr/>
+        <p:txBody>
+          <a:bodyPr/>
+          <a:lstStyle/>
+          <a:p>
+            <a:r>
+              <a:rPr lang="en-US"/>
+              <a:t>21 June 2021</a:t>
+            </a:r>
+          </a:p>
+        </p:txBody>
+      </p:sp>
+      <p:sp>
+        <p:nvSpPr>
+          <p:cNvPr id="5" name="Footer Placeholder 4">
+            <a:extLst>
+              <a:ext uri="{FF2B5EF4-FFF2-40B4-BE49-F238E27FC236}">
+                <a16:creationId xmlns:a16="http://schemas.microsoft.com/office/drawing/2014/main" id="{139ABF6F-AAC1-2846-A256-BD33395F8135}"/>
+              </a:ext>
+            </a:extLst>
+          </p:cNvPr>
+          <p:cNvSpPr>
+            <a:spLocks noGrp="1"/>
+          </p:cNvSpPr>
+          <p:nvPr>
+            <p:ph type="ftr" sz="quarter" idx="11"/>
+          </p:nvPr>
+        </p:nvSpPr>
+        <p:spPr/>
+        <p:txBody>
+          <a:bodyPr/>
+          <a:lstStyle/>
+          <a:p>
+            <a:r>
+              <a:rPr lang="en-US"/>
+              <a:t>Mykhaylo (Mike) Shumko | aurora-asi-lib | 2021 CEDAR Workshop</a:t>
+            </a:r>
+          </a:p>
+        </p:txBody>
+      </p:sp>
+      <p:sp>
+        <p:nvSpPr>
+          <p:cNvPr id="6" name="Slide Number Placeholder 5">
+            <a:extLst>
+              <a:ext uri="{FF2B5EF4-FFF2-40B4-BE49-F238E27FC236}">
+                <a16:creationId xmlns:a16="http://schemas.microsoft.com/office/drawing/2014/main" id="{5DAEC020-5D6A-BD40-84BD-ADFB9FFE112C}"/>
+              </a:ext>
+            </a:extLst>
+          </p:cNvPr>
+          <p:cNvSpPr>
+            <a:spLocks noGrp="1"/>
+          </p:cNvSpPr>
+          <p:nvPr>
+            <p:ph type="sldNum" sz="quarter" idx="12"/>
+          </p:nvPr>
+        </p:nvSpPr>
+        <p:spPr/>
+        <p:txBody>
+          <a:bodyPr/>
+          <a:lstStyle/>
+          <a:p>
+            <a:fld id="{5FE5D21B-D093-CC4D-9CB2-6B9391E84221}" type="slidenum">
+              <a:rPr lang="en-US" smtClean="0"/>
+              <a:t>10</a:t>
+            </a:fld>
+            <a:endParaRPr lang="en-US"/>
+          </a:p>
+        </p:txBody>
+      </p:sp>
+    </p:spTree>
+    <p:extLst>
+      <p:ext uri="{BB962C8B-B14F-4D97-AF65-F5344CB8AC3E}">
+        <p14:creationId xmlns:p14="http://schemas.microsoft.com/office/powerpoint/2010/main" val="88996792"/>
       </p:ext>
     </p:extLst>
   </p:cSld>
@@ -4039,7 +4300,7 @@
         <p:spPr>
           <a:xfrm>
             <a:off x="486697" y="1170210"/>
-            <a:ext cx="5609303" cy="4401205"/>
+            <a:ext cx="5609303" cy="5262979"/>
           </a:xfrm>
           <a:prstGeom prst="rect">
             <a:avLst/>
@@ -4053,8 +4314,14 @@
           <a:lstStyle/>
           <a:p>
             <a:r>
+              <a:rPr lang="en-US" sz="2800" b="1" dirty="0"/>
+              <a:t>What? </a:t>
+            </a:r>
+          </a:p>
+          <a:p>
+            <a:r>
               <a:rPr lang="en-US" sz="2800" dirty="0"/>
-              <a:t>A python package that enables seamless and painless handling and  analysis of aurora images</a:t>
+              <a:t>A python package that enables seamless and painless handling and  analysis of auroral images</a:t>
             </a:r>
           </a:p>
           <a:p>
@@ -4062,16 +4329,26 @@
           </a:p>
           <a:p>
             <a:r>
+              <a:rPr lang="en-US" sz="2800" b="1" dirty="0"/>
+              <a:t>Why? </a:t>
+            </a:r>
+          </a:p>
+          <a:p>
+            <a:r>
               <a:rPr lang="en-US" sz="2800" dirty="0"/>
-              <a:t>Who has the time to write programs to process aurora data? Aurora researchers follow the same steps, and </a:t>
-            </a:r>
-            <a:r>
-              <a:rPr lang="en-US" sz="2800" dirty="0" err="1"/>
+              <a:t>Who has the time to write programs to process aurora data? </a:t>
+            </a:r>
+            <a:r>
+              <a:rPr lang="en-US" sz="2800" b="1" dirty="0"/>
+              <a:t>All auroral researchers do similar analysis steps---</a:t>
+            </a:r>
+            <a:r>
+              <a:rPr lang="en-US" sz="2800" b="1" dirty="0" err="1"/>
               <a:t>asilib</a:t>
             </a:r>
             <a:r>
-              <a:rPr lang="en-US" sz="2800" dirty="0"/>
-              <a:t> helps by focusing their time time on what matters: studying the aurora!</a:t>
+              <a:rPr lang="en-US" sz="2800" b="1" dirty="0"/>
+              <a:t> helps by focusing their time and energy on what matters: studying the aurora!</a:t>
             </a:r>
           </a:p>
         </p:txBody>
@@ -4106,7 +4383,7 @@
           <a:p>
             <a:r>
               <a:rPr lang="en-US" sz="4800" dirty="0"/>
-              <a:t>What is aurora-</a:t>
+              <a:t>aurora-</a:t>
             </a:r>
             <a:r>
               <a:rPr lang="en-US" sz="4800" dirty="0" err="1"/>
@@ -4114,7 +4391,7 @@
             </a:r>
             <a:r>
               <a:rPr lang="en-US" sz="4800" dirty="0"/>
-              <a:t>-lib? </a:t>
+              <a:t>-lib overview </a:t>
             </a:r>
           </a:p>
         </p:txBody>
@@ -4178,6 +4455,34 @@
           <a:chExt cx="0" cy="0"/>
         </a:xfrm>
       </p:grpSpPr>
+      <p:pic>
+        <p:nvPicPr>
+          <p:cNvPr id="9" name="Content Placeholder 8" descr="A picture containing graphical user interface&#10;&#10;Description automatically generated">
+            <a:extLst>
+              <a:ext uri="{FF2B5EF4-FFF2-40B4-BE49-F238E27FC236}">
+                <a16:creationId xmlns:a16="http://schemas.microsoft.com/office/drawing/2014/main" id="{01A184F9-6D96-1F46-92DC-6FBCB093BB27}"/>
+              </a:ext>
+            </a:extLst>
+          </p:cNvPr>
+          <p:cNvPicPr>
+            <a:picLocks noGrp="1" noChangeAspect="1"/>
+          </p:cNvPicPr>
+          <p:nvPr>
+            <p:ph idx="1"/>
+          </p:nvPr>
+        </p:nvPicPr>
+        <p:blipFill rotWithShape="1">
+          <a:blip r:embed="rId2"/>
+          <a:srcRect l="22308" t="11903" r="19627" b="10701"/>
+          <a:stretch/>
+        </p:blipFill>
+        <p:spPr>
+          <a:xfrm>
+            <a:off x="6763825" y="775605"/>
+            <a:ext cx="5136472" cy="5134914"/>
+          </a:xfrm>
+        </p:spPr>
+      </p:pic>
       <p:sp>
         <p:nvSpPr>
           <p:cNvPr id="4" name="Date Placeholder 3">
@@ -4373,7 +4678,7 @@
           <a:p>
             <a:r>
               <a:rPr lang="en-US" sz="4800" dirty="0"/>
-              <a:t>What is aurora-</a:t>
+              <a:t>aurora-</a:t>
             </a:r>
             <a:r>
               <a:rPr lang="en-US" sz="4800" dirty="0" err="1"/>
@@ -4381,40 +4686,11 @@
             </a:r>
             <a:r>
               <a:rPr lang="en-US" sz="4800" dirty="0"/>
-              <a:t>-lib? </a:t>
-            </a:r>
-          </a:p>
-        </p:txBody>
-      </p:sp>
-      <p:pic>
-        <p:nvPicPr>
-          <p:cNvPr id="8" name="Content Placeholder 7">
-            <a:extLst>
-              <a:ext uri="{FF2B5EF4-FFF2-40B4-BE49-F238E27FC236}">
-                <a16:creationId xmlns:a16="http://schemas.microsoft.com/office/drawing/2014/main" id="{6102A8C0-ADDF-CF4C-A036-291351DDE72E}"/>
-              </a:ext>
-            </a:extLst>
-          </p:cNvPr>
-          <p:cNvPicPr>
-            <a:picLocks noGrp="1" noChangeAspect="1"/>
-          </p:cNvPicPr>
-          <p:nvPr>
-            <p:ph idx="1"/>
-          </p:nvPr>
-        </p:nvPicPr>
-        <p:blipFill>
-          <a:blip r:embed="rId2"/>
-          <a:stretch>
-            <a:fillRect/>
-          </a:stretch>
-        </p:blipFill>
-        <p:spPr>
-          <a:xfrm>
-            <a:off x="6740013" y="775605"/>
-            <a:ext cx="5134914" cy="5134914"/>
-          </a:xfrm>
-        </p:spPr>
-      </p:pic>
+              <a:t>-lib overview </a:t>
+            </a:r>
+          </a:p>
+        </p:txBody>
+      </p:sp>
     </p:spTree>
     <p:extLst>
       <p:ext uri="{BB962C8B-B14F-4D97-AF65-F5344CB8AC3E}">
@@ -4467,7 +4743,7 @@
           <a:lstStyle/>
           <a:p>
             <a:r>
-              <a:rPr lang="en-US"/>
+              <a:rPr lang="en-US" dirty="0"/>
               <a:t>21 June 2021</a:t>
             </a:r>
           </a:p>
@@ -4609,6 +4885,824 @@
               <a:rPr lang="en-US" sz="4800" dirty="0"/>
               <a:t>What can it do?</a:t>
             </a:r>
+          </a:p>
+        </p:txBody>
+      </p:sp>
+      <p:sp>
+        <p:nvSpPr>
+          <p:cNvPr id="22" name="TextBox 21">
+            <a:extLst>
+              <a:ext uri="{FF2B5EF4-FFF2-40B4-BE49-F238E27FC236}">
+                <a16:creationId xmlns:a16="http://schemas.microsoft.com/office/drawing/2014/main" id="{2C26067A-58FA-8247-AAE3-34DA6D821596}"/>
+              </a:ext>
+            </a:extLst>
+          </p:cNvPr>
+          <p:cNvSpPr txBox="1"/>
+          <p:nvPr/>
+        </p:nvSpPr>
+        <p:spPr>
+          <a:xfrm>
+            <a:off x="206018" y="1312643"/>
+            <a:ext cx="6548284" cy="830997"/>
+          </a:xfrm>
+          <a:prstGeom prst="rect">
+            <a:avLst/>
+          </a:prstGeom>
+          <a:noFill/>
+        </p:spPr>
+        <p:txBody>
+          <a:bodyPr wrap="square" rtlCol="0">
+            <a:spAutoFit/>
+          </a:bodyPr>
+          <a:lstStyle/>
+          <a:p>
+            <a:r>
+              <a:rPr lang="en-US" sz="2400" dirty="0"/>
+              <a:t>Plot one fisheye lens frame:</a:t>
+            </a:r>
+          </a:p>
+          <a:p>
+            <a:r>
+              <a:rPr lang="en-US" sz="2400" dirty="0"/>
+              <a:t>	</a:t>
+            </a:r>
+            <a:r>
+              <a:rPr lang="en-US" sz="2400" dirty="0" err="1"/>
+              <a:t>asilib.plot_frame</a:t>
+            </a:r>
+            <a:r>
+              <a:rPr lang="en-US" sz="2400" dirty="0"/>
+              <a:t>()</a:t>
+            </a:r>
+          </a:p>
+        </p:txBody>
+      </p:sp>
+      <p:sp>
+        <p:nvSpPr>
+          <p:cNvPr id="24" name="TextBox 23">
+            <a:extLst>
+              <a:ext uri="{FF2B5EF4-FFF2-40B4-BE49-F238E27FC236}">
+                <a16:creationId xmlns:a16="http://schemas.microsoft.com/office/drawing/2014/main" id="{4505CAC3-8F41-E64E-8E5D-6B9BF96DE473}"/>
+              </a:ext>
+            </a:extLst>
+          </p:cNvPr>
+          <p:cNvSpPr txBox="1"/>
+          <p:nvPr/>
+        </p:nvSpPr>
+        <p:spPr>
+          <a:xfrm>
+            <a:off x="206018" y="2378285"/>
+            <a:ext cx="6548284" cy="1200329"/>
+          </a:xfrm>
+          <a:prstGeom prst="rect">
+            <a:avLst/>
+          </a:prstGeom>
+          <a:noFill/>
+        </p:spPr>
+        <p:txBody>
+          <a:bodyPr wrap="square" rtlCol="0">
+            <a:spAutoFit/>
+          </a:bodyPr>
+          <a:lstStyle/>
+          <a:p>
+            <a:r>
+              <a:rPr lang="en-US" sz="2400" dirty="0"/>
+              <a:t>Make a movie:</a:t>
+            </a:r>
+          </a:p>
+          <a:p>
+            <a:r>
+              <a:rPr lang="en-US" sz="2400" dirty="0"/>
+              <a:t>	</a:t>
+            </a:r>
+            <a:r>
+              <a:rPr lang="en-US" sz="2400" dirty="0" err="1"/>
+              <a:t>asilib.plot_movie</a:t>
+            </a:r>
+            <a:r>
+              <a:rPr lang="en-US" sz="2400" dirty="0"/>
+              <a:t>()*</a:t>
+            </a:r>
+          </a:p>
+          <a:p>
+            <a:r>
+              <a:rPr lang="en-US" sz="2400" dirty="0"/>
+              <a:t>	</a:t>
+            </a:r>
+            <a:r>
+              <a:rPr lang="en-US" sz="2400" dirty="0" err="1"/>
+              <a:t>asilib.plot_movie_generator</a:t>
+            </a:r>
+            <a:r>
+              <a:rPr lang="en-US" sz="2400" dirty="0"/>
+              <a:t>()*</a:t>
+            </a:r>
+          </a:p>
+        </p:txBody>
+      </p:sp>
+      <p:sp>
+        <p:nvSpPr>
+          <p:cNvPr id="26" name="TextBox 25">
+            <a:extLst>
+              <a:ext uri="{FF2B5EF4-FFF2-40B4-BE49-F238E27FC236}">
+                <a16:creationId xmlns:a16="http://schemas.microsoft.com/office/drawing/2014/main" id="{CCFE1E1F-68EF-E841-A844-3283E528CAEA}"/>
+              </a:ext>
+            </a:extLst>
+          </p:cNvPr>
+          <p:cNvSpPr txBox="1"/>
+          <p:nvPr/>
+        </p:nvSpPr>
+        <p:spPr>
+          <a:xfrm>
+            <a:off x="206018" y="3869151"/>
+            <a:ext cx="6548284" cy="830997"/>
+          </a:xfrm>
+          <a:prstGeom prst="rect">
+            <a:avLst/>
+          </a:prstGeom>
+          <a:noFill/>
+        </p:spPr>
+        <p:txBody>
+          <a:bodyPr wrap="square" rtlCol="0">
+            <a:spAutoFit/>
+          </a:bodyPr>
+          <a:lstStyle/>
+          <a:p>
+            <a:r>
+              <a:rPr lang="en-US" sz="2400" dirty="0"/>
+              <a:t>Plot a </a:t>
+            </a:r>
+            <a:r>
+              <a:rPr lang="en-US" sz="2400" dirty="0" err="1"/>
+              <a:t>keogram</a:t>
+            </a:r>
+            <a:r>
+              <a:rPr lang="en-US" sz="2400" dirty="0"/>
+              <a:t>:</a:t>
+            </a:r>
+          </a:p>
+          <a:p>
+            <a:r>
+              <a:rPr lang="en-US" sz="2400" dirty="0"/>
+              <a:t>	</a:t>
+            </a:r>
+            <a:r>
+              <a:rPr lang="en-US" sz="2400" dirty="0" err="1"/>
+              <a:t>asilib.plot_keogram</a:t>
+            </a:r>
+            <a:r>
+              <a:rPr lang="en-US" sz="2400" dirty="0"/>
+              <a:t>()</a:t>
+            </a:r>
+          </a:p>
+        </p:txBody>
+      </p:sp>
+      <p:sp>
+        <p:nvSpPr>
+          <p:cNvPr id="2" name="Rectangle 1">
+            <a:extLst>
+              <a:ext uri="{FF2B5EF4-FFF2-40B4-BE49-F238E27FC236}">
+                <a16:creationId xmlns:a16="http://schemas.microsoft.com/office/drawing/2014/main" id="{4CE60C03-A0C3-E14C-96E2-AFE3BCEDB8C1}"/>
+              </a:ext>
+            </a:extLst>
+          </p:cNvPr>
+          <p:cNvSpPr/>
+          <p:nvPr/>
+        </p:nvSpPr>
+        <p:spPr>
+          <a:xfrm>
+            <a:off x="284281" y="5821683"/>
+            <a:ext cx="1890582" cy="369332"/>
+          </a:xfrm>
+          <a:prstGeom prst="rect">
+            <a:avLst/>
+          </a:prstGeom>
+        </p:spPr>
+        <p:txBody>
+          <a:bodyPr wrap="none">
+            <a:spAutoFit/>
+          </a:bodyPr>
+          <a:lstStyle/>
+          <a:p>
+            <a:r>
+              <a:rPr lang="en-US" dirty="0"/>
+              <a:t>* Requires </a:t>
+            </a:r>
+            <a:r>
+              <a:rPr lang="en-US" dirty="0" err="1"/>
+              <a:t>ffmpeg</a:t>
+            </a:r>
+            <a:endParaRPr lang="en-US" dirty="0"/>
+          </a:p>
+        </p:txBody>
+      </p:sp>
+    </p:spTree>
+    <p:extLst>
+      <p:ext uri="{BB962C8B-B14F-4D97-AF65-F5344CB8AC3E}">
+        <p14:creationId xmlns:p14="http://schemas.microsoft.com/office/powerpoint/2010/main" val="4200698272"/>
+      </p:ext>
+    </p:extLst>
+  </p:cSld>
+  <p:clrMapOvr>
+    <a:masterClrMapping/>
+  </p:clrMapOvr>
+  <p:timing>
+    <p:tnLst>
+      <p:par>
+        <p:cTn id="1" dur="indefinite" restart="never" nodeType="tmRoot">
+          <p:childTnLst>
+            <p:seq concurrent="1" nextAc="seek">
+              <p:cTn id="2" dur="indefinite" nodeType="mainSeq">
+                <p:childTnLst>
+                  <p:par>
+                    <p:cTn id="3" fill="hold">
+                      <p:stCondLst>
+                        <p:cond delay="indefinite"/>
+                      </p:stCondLst>
+                      <p:childTnLst>
+                        <p:par>
+                          <p:cTn id="4" fill="hold">
+                            <p:stCondLst>
+                              <p:cond delay="0"/>
+                            </p:stCondLst>
+                            <p:childTnLst>
+                              <p:par>
+                                <p:cTn id="5" presetID="1" presetClass="mediacall" presetSubtype="0" fill="hold" nodeType="clickEffect">
+                                  <p:stCondLst>
+                                    <p:cond delay="0"/>
+                                  </p:stCondLst>
+                                  <p:childTnLst>
+                                    <p:cmd type="call" cmd="playFrom(0.0)">
+                                      <p:cBhvr>
+                                        <p:cTn id="6" dur="4000" fill="hold"/>
+                                        <p:tgtEl>
+                                          <p:spTgt spid="16"/>
+                                        </p:tgtEl>
+                                      </p:cBhvr>
+                                    </p:cmd>
+                                  </p:childTnLst>
+                                </p:cTn>
+                              </p:par>
+                            </p:childTnLst>
+                          </p:cTn>
+                        </p:par>
+                      </p:childTnLst>
+                    </p:cTn>
+                  </p:par>
+                  <p:par>
+                    <p:cTn id="7" fill="hold">
+                      <p:stCondLst>
+                        <p:cond delay="indefinite"/>
+                      </p:stCondLst>
+                      <p:childTnLst>
+                        <p:par>
+                          <p:cTn id="8" fill="hold">
+                            <p:stCondLst>
+                              <p:cond delay="0"/>
+                            </p:stCondLst>
+                            <p:childTnLst>
+                              <p:par>
+                                <p:cTn id="9" presetID="1" presetClass="entr" presetSubtype="0" fill="hold" grpId="0" nodeType="clickEffect">
+                                  <p:stCondLst>
+                                    <p:cond delay="0"/>
+                                  </p:stCondLst>
+                                  <p:childTnLst>
+                                    <p:set>
+                                      <p:cBhvr>
+                                        <p:cTn id="10" dur="1" fill="hold">
+                                          <p:stCondLst>
+                                            <p:cond delay="0"/>
+                                          </p:stCondLst>
+                                        </p:cTn>
+                                        <p:tgtEl>
+                                          <p:spTgt spid="22"/>
+                                        </p:tgtEl>
+                                        <p:attrNameLst>
+                                          <p:attrName>style.visibility</p:attrName>
+                                        </p:attrNameLst>
+                                      </p:cBhvr>
+                                      <p:to>
+                                        <p:strVal val="visible"/>
+                                      </p:to>
+                                    </p:set>
+                                  </p:childTnLst>
+                                </p:cTn>
+                              </p:par>
+                            </p:childTnLst>
+                          </p:cTn>
+                        </p:par>
+                      </p:childTnLst>
+                    </p:cTn>
+                  </p:par>
+                  <p:par>
+                    <p:cTn id="11" fill="hold">
+                      <p:stCondLst>
+                        <p:cond delay="indefinite"/>
+                      </p:stCondLst>
+                      <p:childTnLst>
+                        <p:par>
+                          <p:cTn id="12" fill="hold">
+                            <p:stCondLst>
+                              <p:cond delay="0"/>
+                            </p:stCondLst>
+                            <p:childTnLst>
+                              <p:par>
+                                <p:cTn id="13" presetID="1" presetClass="entr" presetSubtype="0" fill="hold" grpId="0" nodeType="clickEffect">
+                                  <p:stCondLst>
+                                    <p:cond delay="0"/>
+                                  </p:stCondLst>
+                                  <p:childTnLst>
+                                    <p:set>
+                                      <p:cBhvr>
+                                        <p:cTn id="14" dur="1" fill="hold">
+                                          <p:stCondLst>
+                                            <p:cond delay="0"/>
+                                          </p:stCondLst>
+                                        </p:cTn>
+                                        <p:tgtEl>
+                                          <p:spTgt spid="24"/>
+                                        </p:tgtEl>
+                                        <p:attrNameLst>
+                                          <p:attrName>style.visibility</p:attrName>
+                                        </p:attrNameLst>
+                                      </p:cBhvr>
+                                      <p:to>
+                                        <p:strVal val="visible"/>
+                                      </p:to>
+                                    </p:set>
+                                  </p:childTnLst>
+                                </p:cTn>
+                              </p:par>
+                            </p:childTnLst>
+                          </p:cTn>
+                        </p:par>
+                      </p:childTnLst>
+                    </p:cTn>
+                  </p:par>
+                  <p:par>
+                    <p:cTn id="15" fill="hold">
+                      <p:stCondLst>
+                        <p:cond delay="indefinite"/>
+                      </p:stCondLst>
+                      <p:childTnLst>
+                        <p:par>
+                          <p:cTn id="16" fill="hold">
+                            <p:stCondLst>
+                              <p:cond delay="0"/>
+                            </p:stCondLst>
+                            <p:childTnLst>
+                              <p:par>
+                                <p:cTn id="17" presetID="1" presetClass="entr" presetSubtype="0" fill="hold" grpId="0" nodeType="clickEffect">
+                                  <p:stCondLst>
+                                    <p:cond delay="0"/>
+                                  </p:stCondLst>
+                                  <p:childTnLst>
+                                    <p:set>
+                                      <p:cBhvr>
+                                        <p:cTn id="18" dur="1" fill="hold">
+                                          <p:stCondLst>
+                                            <p:cond delay="0"/>
+                                          </p:stCondLst>
+                                        </p:cTn>
+                                        <p:tgtEl>
+                                          <p:spTgt spid="26"/>
+                                        </p:tgtEl>
+                                        <p:attrNameLst>
+                                          <p:attrName>style.visibility</p:attrName>
+                                        </p:attrNameLst>
+                                      </p:cBhvr>
+                                      <p:to>
+                                        <p:strVal val="visible"/>
+                                      </p:to>
+                                    </p:set>
+                                  </p:childTnLst>
+                                </p:cTn>
+                              </p:par>
+                            </p:childTnLst>
+                          </p:cTn>
+                        </p:par>
+                      </p:childTnLst>
+                    </p:cTn>
+                  </p:par>
+                </p:childTnLst>
+              </p:cTn>
+              <p:prevCondLst>
+                <p:cond evt="onPrev" delay="0">
+                  <p:tgtEl>
+                    <p:sldTgt/>
+                  </p:tgtEl>
+                </p:cond>
+              </p:prevCondLst>
+              <p:nextCondLst>
+                <p:cond evt="onNext" delay="0">
+                  <p:tgtEl>
+                    <p:sldTgt/>
+                  </p:tgtEl>
+                </p:cond>
+              </p:nextCondLst>
+            </p:seq>
+            <p:video>
+              <p:cMediaNode vol="80000">
+                <p:cTn id="19" repeatCount="indefinite" fill="hold" display="0">
+                  <p:stCondLst>
+                    <p:cond delay="indefinite"/>
+                  </p:stCondLst>
+                </p:cTn>
+                <p:tgtEl>
+                  <p:spTgt spid="16"/>
+                </p:tgtEl>
+              </p:cMediaNode>
+            </p:video>
+            <p:seq concurrent="1" nextAc="seek">
+              <p:cTn id="20" restart="whenNotActive" fill="hold" evtFilter="cancelBubble" nodeType="interactiveSeq">
+                <p:stCondLst>
+                  <p:cond evt="onClick" delay="0">
+                    <p:tgtEl>
+                      <p:spTgt spid="16"/>
+                    </p:tgtEl>
+                  </p:cond>
+                </p:stCondLst>
+                <p:endSync evt="end" delay="0">
+                  <p:rtn val="all"/>
+                </p:endSync>
+                <p:childTnLst>
+                  <p:par>
+                    <p:cTn id="21" fill="hold">
+                      <p:stCondLst>
+                        <p:cond delay="0"/>
+                      </p:stCondLst>
+                      <p:childTnLst>
+                        <p:par>
+                          <p:cTn id="22" fill="hold">
+                            <p:stCondLst>
+                              <p:cond delay="0"/>
+                            </p:stCondLst>
+                            <p:childTnLst>
+                              <p:par>
+                                <p:cTn id="23" presetID="2" presetClass="mediacall" presetSubtype="0" fill="hold" nodeType="clickEffect">
+                                  <p:stCondLst>
+                                    <p:cond delay="0"/>
+                                  </p:stCondLst>
+                                  <p:childTnLst>
+                                    <p:cmd type="call" cmd="togglePause">
+                                      <p:cBhvr>
+                                        <p:cTn id="24" dur="1" fill="hold"/>
+                                        <p:tgtEl>
+                                          <p:spTgt spid="16"/>
+                                        </p:tgtEl>
+                                      </p:cBhvr>
+                                    </p:cmd>
+                                  </p:childTnLst>
+                                </p:cTn>
+                              </p:par>
+                            </p:childTnLst>
+                          </p:cTn>
+                        </p:par>
+                      </p:childTnLst>
+                    </p:cTn>
+                  </p:par>
+                </p:childTnLst>
+              </p:cTn>
+              <p:nextCondLst>
+                <p:cond evt="onClick" delay="0">
+                  <p:tgtEl>
+                    <p:spTgt spid="16"/>
+                  </p:tgtEl>
+                </p:cond>
+              </p:nextCondLst>
+            </p:seq>
+          </p:childTnLst>
+        </p:cTn>
+      </p:par>
+    </p:tnLst>
+    <p:bldLst>
+      <p:bldP spid="22" grpId="0"/>
+      <p:bldP spid="24" grpId="0"/>
+      <p:bldP spid="26" grpId="0"/>
+    </p:bldLst>
+  </p:timing>
+</p:sld>
+</file>
+
+<file path=ppt/slides/slide5.xml><?xml version="1.0" encoding="utf-8"?>
+<p:sld xmlns:a="http://schemas.openxmlformats.org/drawingml/2006/main" xmlns:r="http://schemas.openxmlformats.org/officeDocument/2006/relationships" xmlns:p="http://schemas.openxmlformats.org/presentationml/2006/main">
+  <p:cSld>
+    <p:spTree>
+      <p:nvGrpSpPr>
+        <p:cNvPr id="1" name=""/>
+        <p:cNvGrpSpPr/>
+        <p:nvPr/>
+      </p:nvGrpSpPr>
+      <p:grpSpPr>
+        <a:xfrm>
+          <a:off x="0" y="0"/>
+          <a:ext cx="0" cy="0"/>
+          <a:chOff x="0" y="0"/>
+          <a:chExt cx="0" cy="0"/>
+        </a:xfrm>
+      </p:grpSpPr>
+      <p:sp>
+        <p:nvSpPr>
+          <p:cNvPr id="4" name="Date Placeholder 3">
+            <a:extLst>
+              <a:ext uri="{FF2B5EF4-FFF2-40B4-BE49-F238E27FC236}">
+                <a16:creationId xmlns:a16="http://schemas.microsoft.com/office/drawing/2014/main" id="{46C4E898-1C82-6840-B020-B0B623543BC0}"/>
+              </a:ext>
+            </a:extLst>
+          </p:cNvPr>
+          <p:cNvSpPr>
+            <a:spLocks noGrp="1"/>
+          </p:cNvSpPr>
+          <p:nvPr>
+            <p:ph type="dt" sz="half" idx="10"/>
+          </p:nvPr>
+        </p:nvSpPr>
+        <p:spPr/>
+        <p:txBody>
+          <a:bodyPr/>
+          <a:lstStyle/>
+          <a:p>
+            <a:r>
+              <a:rPr lang="en-US"/>
+              <a:t>21 June 2021</a:t>
+            </a:r>
+          </a:p>
+        </p:txBody>
+      </p:sp>
+      <p:sp>
+        <p:nvSpPr>
+          <p:cNvPr id="5" name="Footer Placeholder 4">
+            <a:extLst>
+              <a:ext uri="{FF2B5EF4-FFF2-40B4-BE49-F238E27FC236}">
+                <a16:creationId xmlns:a16="http://schemas.microsoft.com/office/drawing/2014/main" id="{336FEAAC-A88C-6C4B-858B-219BAD7D40EF}"/>
+              </a:ext>
+            </a:extLst>
+          </p:cNvPr>
+          <p:cNvSpPr>
+            <a:spLocks noGrp="1"/>
+          </p:cNvSpPr>
+          <p:nvPr>
+            <p:ph type="ftr" sz="quarter" idx="11"/>
+          </p:nvPr>
+        </p:nvSpPr>
+        <p:spPr/>
+        <p:txBody>
+          <a:bodyPr/>
+          <a:lstStyle/>
+          <a:p>
+            <a:r>
+              <a:rPr lang="en-US" dirty="0"/>
+              <a:t>Mykhaylo (Mike) Shumko | aurora-</a:t>
+            </a:r>
+            <a:r>
+              <a:rPr lang="en-US" dirty="0" err="1"/>
+              <a:t>asi</a:t>
+            </a:r>
+            <a:r>
+              <a:rPr lang="en-US" dirty="0"/>
+              <a:t>-lib | 2021 CEDAR Workshop</a:t>
+            </a:r>
+          </a:p>
+        </p:txBody>
+      </p:sp>
+      <p:sp>
+        <p:nvSpPr>
+          <p:cNvPr id="6" name="Slide Number Placeholder 5">
+            <a:extLst>
+              <a:ext uri="{FF2B5EF4-FFF2-40B4-BE49-F238E27FC236}">
+                <a16:creationId xmlns:a16="http://schemas.microsoft.com/office/drawing/2014/main" id="{FAC691CF-3298-1344-8B16-27A7376F6F76}"/>
+              </a:ext>
+            </a:extLst>
+          </p:cNvPr>
+          <p:cNvSpPr>
+            <a:spLocks noGrp="1"/>
+          </p:cNvSpPr>
+          <p:nvPr>
+            <p:ph type="sldNum" sz="quarter" idx="12"/>
+          </p:nvPr>
+        </p:nvSpPr>
+        <p:spPr/>
+        <p:txBody>
+          <a:bodyPr/>
+          <a:lstStyle/>
+          <a:p>
+            <a:fld id="{5FE5D21B-D093-CC4D-9CB2-6B9391E84221}" type="slidenum">
+              <a:rPr lang="en-US" smtClean="0"/>
+              <a:t>5</a:t>
+            </a:fld>
+            <a:endParaRPr lang="en-US"/>
+          </a:p>
+        </p:txBody>
+      </p:sp>
+      <p:pic>
+        <p:nvPicPr>
+          <p:cNvPr id="16" name="20170915_023300_023457_themis_rank.mp4" descr="20170915_023300_023457_themis_rank.mp4">
+            <a:hlinkClick r:id="" action="ppaction://media"/>
+            <a:extLst>
+              <a:ext uri="{FF2B5EF4-FFF2-40B4-BE49-F238E27FC236}">
+                <a16:creationId xmlns:a16="http://schemas.microsoft.com/office/drawing/2014/main" id="{F11A9636-E35C-EF46-978D-DA8B052C3BA3}"/>
+              </a:ext>
+            </a:extLst>
+          </p:cNvPr>
+          <p:cNvPicPr>
+            <a:picLocks noGrp="1" noChangeAspect="1"/>
+          </p:cNvPicPr>
+          <p:nvPr>
+            <p:ph idx="1"/>
+            <a:videoFile r:link="rId2"/>
+            <p:extLst>
+              <p:ext uri="{DAA4B4D4-6D71-4841-9C94-3DE7FCFB9230}">
+                <p14:media xmlns:p14="http://schemas.microsoft.com/office/powerpoint/2010/main" r:embed="rId1"/>
+              </p:ext>
+            </p:extLst>
+          </p:nvPr>
+        </p:nvPicPr>
+        <p:blipFill>
+          <a:blip r:embed="rId4"/>
+          <a:stretch>
+            <a:fillRect/>
+          </a:stretch>
+        </p:blipFill>
+        <p:spPr>
+          <a:xfrm>
+            <a:off x="6653061" y="0"/>
+            <a:ext cx="4365830" cy="6236899"/>
+          </a:xfrm>
+          <a:prstGeom prst="rect">
+            <a:avLst/>
+          </a:prstGeom>
+        </p:spPr>
+      </p:pic>
+      <p:sp>
+        <p:nvSpPr>
+          <p:cNvPr id="20" name="TextBox 19">
+            <a:extLst>
+              <a:ext uri="{FF2B5EF4-FFF2-40B4-BE49-F238E27FC236}">
+                <a16:creationId xmlns:a16="http://schemas.microsoft.com/office/drawing/2014/main" id="{EF20BE0D-408D-524D-A428-9300B661EC2D}"/>
+              </a:ext>
+            </a:extLst>
+          </p:cNvPr>
+          <p:cNvSpPr txBox="1"/>
+          <p:nvPr/>
+        </p:nvSpPr>
+        <p:spPr>
+          <a:xfrm>
+            <a:off x="678426" y="339213"/>
+            <a:ext cx="5869858" cy="830997"/>
+          </a:xfrm>
+          <a:prstGeom prst="rect">
+            <a:avLst/>
+          </a:prstGeom>
+          <a:noFill/>
+        </p:spPr>
+        <p:txBody>
+          <a:bodyPr wrap="square" rtlCol="0">
+            <a:spAutoFit/>
+          </a:bodyPr>
+          <a:lstStyle/>
+          <a:p>
+            <a:r>
+              <a:rPr lang="en-US" sz="4800" dirty="0"/>
+              <a:t>What can it do?</a:t>
+            </a:r>
+          </a:p>
+        </p:txBody>
+      </p:sp>
+      <p:sp>
+        <p:nvSpPr>
+          <p:cNvPr id="26" name="TextBox 25">
+            <a:extLst>
+              <a:ext uri="{FF2B5EF4-FFF2-40B4-BE49-F238E27FC236}">
+                <a16:creationId xmlns:a16="http://schemas.microsoft.com/office/drawing/2014/main" id="{CCFE1E1F-68EF-E841-A844-3283E528CAEA}"/>
+              </a:ext>
+            </a:extLst>
+          </p:cNvPr>
+          <p:cNvSpPr txBox="1"/>
+          <p:nvPr/>
+        </p:nvSpPr>
+        <p:spPr>
+          <a:xfrm>
+            <a:off x="339213" y="2150851"/>
+            <a:ext cx="6548284" cy="1200329"/>
+          </a:xfrm>
+          <a:prstGeom prst="rect">
+            <a:avLst/>
+          </a:prstGeom>
+          <a:noFill/>
+        </p:spPr>
+        <p:txBody>
+          <a:bodyPr wrap="square" rtlCol="0">
+            <a:spAutoFit/>
+          </a:bodyPr>
+          <a:lstStyle/>
+          <a:p>
+            <a:r>
+              <a:rPr lang="en-US" sz="2400" dirty="0"/>
+              <a:t>Map a satellite’s location:</a:t>
+            </a:r>
+          </a:p>
+          <a:p>
+            <a:r>
+              <a:rPr lang="en-US" sz="2400" dirty="0"/>
+              <a:t>	asilib.lla2azel()</a:t>
+            </a:r>
+          </a:p>
+          <a:p>
+            <a:r>
+              <a:rPr lang="en-US" sz="2400" dirty="0"/>
+              <a:t>	asilib.lla2footprint()*</a:t>
+            </a:r>
+          </a:p>
+        </p:txBody>
+      </p:sp>
+      <p:sp>
+        <p:nvSpPr>
+          <p:cNvPr id="27" name="TextBox 26">
+            <a:extLst>
+              <a:ext uri="{FF2B5EF4-FFF2-40B4-BE49-F238E27FC236}">
+                <a16:creationId xmlns:a16="http://schemas.microsoft.com/office/drawing/2014/main" id="{2AEEDDEE-2246-764A-B249-B2B1C0F95AF7}"/>
+              </a:ext>
+            </a:extLst>
+          </p:cNvPr>
+          <p:cNvSpPr txBox="1"/>
+          <p:nvPr/>
+        </p:nvSpPr>
+        <p:spPr>
+          <a:xfrm>
+            <a:off x="339213" y="4078459"/>
+            <a:ext cx="6548284" cy="830997"/>
+          </a:xfrm>
+          <a:prstGeom prst="rect">
+            <a:avLst/>
+          </a:prstGeom>
+          <a:noFill/>
+        </p:spPr>
+        <p:txBody>
+          <a:bodyPr wrap="square" rtlCol="0">
+            <a:spAutoFit/>
+          </a:bodyPr>
+          <a:lstStyle/>
+          <a:p>
+            <a:r>
+              <a:rPr lang="en-US" sz="2400" dirty="0"/>
+              <a:t>Calculate equal areas in the image:</a:t>
+            </a:r>
+          </a:p>
+          <a:p>
+            <a:r>
+              <a:rPr lang="en-US" sz="2400" dirty="0"/>
+              <a:t>	</a:t>
+            </a:r>
+            <a:r>
+              <a:rPr lang="en-US" sz="2400" dirty="0" err="1"/>
+              <a:t>asilib.equal_area</a:t>
+            </a:r>
+            <a:r>
+              <a:rPr lang="en-US" sz="2400" dirty="0"/>
+              <a:t>()</a:t>
+            </a:r>
+          </a:p>
+        </p:txBody>
+      </p:sp>
+      <p:sp>
+        <p:nvSpPr>
+          <p:cNvPr id="28" name="TextBox 27">
+            <a:extLst>
+              <a:ext uri="{FF2B5EF4-FFF2-40B4-BE49-F238E27FC236}">
+                <a16:creationId xmlns:a16="http://schemas.microsoft.com/office/drawing/2014/main" id="{B6DF9119-5920-4E4E-87D4-E403E57E7B5F}"/>
+              </a:ext>
+            </a:extLst>
+          </p:cNvPr>
+          <p:cNvSpPr txBox="1"/>
+          <p:nvPr/>
+        </p:nvSpPr>
+        <p:spPr>
+          <a:xfrm>
+            <a:off x="542925" y="5514975"/>
+            <a:ext cx="3800475" cy="369332"/>
+          </a:xfrm>
+          <a:prstGeom prst="rect">
+            <a:avLst/>
+          </a:prstGeom>
+          <a:noFill/>
+        </p:spPr>
+        <p:txBody>
+          <a:bodyPr wrap="square" rtlCol="0">
+            <a:spAutoFit/>
+          </a:bodyPr>
+          <a:lstStyle/>
+          <a:p>
+            <a:r>
+              <a:rPr lang="en-US" dirty="0"/>
+              <a:t>* Requires </a:t>
+            </a:r>
+            <a:r>
+              <a:rPr lang="en-US" dirty="0">
+                <a:hlinkClick r:id="rId5"/>
+              </a:rPr>
+              <a:t>IRBEM</a:t>
+            </a:r>
+            <a:endParaRPr lang="en-US" dirty="0"/>
           </a:p>
         </p:txBody>
       </p:sp>
@@ -4665,6 +5759,96 @@
                       </p:childTnLst>
                     </p:cTn>
                   </p:par>
+                  <p:par>
+                    <p:cTn id="7" fill="hold">
+                      <p:stCondLst>
+                        <p:cond delay="indefinite"/>
+                      </p:stCondLst>
+                      <p:childTnLst>
+                        <p:par>
+                          <p:cTn id="8" fill="hold">
+                            <p:stCondLst>
+                              <p:cond delay="0"/>
+                            </p:stCondLst>
+                            <p:childTnLst>
+                              <p:par>
+                                <p:cTn id="9" presetID="1" presetClass="entr" presetSubtype="0" fill="hold" grpId="0" nodeType="clickEffect">
+                                  <p:stCondLst>
+                                    <p:cond delay="0"/>
+                                  </p:stCondLst>
+                                  <p:childTnLst>
+                                    <p:set>
+                                      <p:cBhvr>
+                                        <p:cTn id="10" dur="1" fill="hold">
+                                          <p:stCondLst>
+                                            <p:cond delay="0"/>
+                                          </p:stCondLst>
+                                        </p:cTn>
+                                        <p:tgtEl>
+                                          <p:spTgt spid="26"/>
+                                        </p:tgtEl>
+                                        <p:attrNameLst>
+                                          <p:attrName>style.visibility</p:attrName>
+                                        </p:attrNameLst>
+                                      </p:cBhvr>
+                                      <p:to>
+                                        <p:strVal val="visible"/>
+                                      </p:to>
+                                    </p:set>
+                                  </p:childTnLst>
+                                </p:cTn>
+                              </p:par>
+                            </p:childTnLst>
+                          </p:cTn>
+                        </p:par>
+                      </p:childTnLst>
+                    </p:cTn>
+                  </p:par>
+                  <p:par>
+                    <p:cTn id="11" fill="hold">
+                      <p:stCondLst>
+                        <p:cond delay="indefinite"/>
+                      </p:stCondLst>
+                      <p:childTnLst>
+                        <p:par>
+                          <p:cTn id="12" fill="hold">
+                            <p:stCondLst>
+                              <p:cond delay="0"/>
+                            </p:stCondLst>
+                            <p:childTnLst>
+                              <p:par>
+                                <p:cTn id="13" presetID="1" presetClass="entr" presetSubtype="0" fill="hold" grpId="0" nodeType="clickEffect">
+                                  <p:stCondLst>
+                                    <p:cond delay="0"/>
+                                  </p:stCondLst>
+                                  <p:childTnLst>
+                                    <p:set>
+                                      <p:cBhvr>
+                                        <p:cTn id="14" dur="1" fill="hold">
+                                          <p:stCondLst>
+                                            <p:cond delay="0"/>
+                                          </p:stCondLst>
+                                        </p:cTn>
+                                        <p:tgtEl>
+                                          <p:spTgt spid="27"/>
+                                        </p:tgtEl>
+                                        <p:attrNameLst>
+                                          <p:attrName>style.visibility</p:attrName>
+                                        </p:attrNameLst>
+                                      </p:cBhvr>
+                                      <p:to>
+                                        <p:strVal val="visible"/>
+                                      </p:to>
+                                    </p:set>
+                                  </p:childTnLst>
+                                </p:cTn>
+                              </p:par>
+                            </p:childTnLst>
+                          </p:cTn>
+                        </p:par>
+                      </p:childTnLst>
+                    </p:cTn>
+                  </p:par>
                 </p:childTnLst>
               </p:cTn>
               <p:prevCondLst>
@@ -4684,7 +5868,7 @@
             </p:seq>
             <p:video>
               <p:cMediaNode vol="80000">
-                <p:cTn id="7" repeatCount="indefinite" fill="hold" display="0">
+                <p:cTn id="15" repeatCount="indefinite" fill="hold" display="0">
                   <p:stCondLst>
                     <p:cond delay="indefinite"/>
                   </p:stCondLst>
@@ -4695,7 +5879,7 @@
               </p:cMediaNode>
             </p:video>
             <p:seq concurrent="1" nextAc="seek">
-              <p:cTn id="8" restart="whenNotActive" fill="hold" evtFilter="cancelBubble" nodeType="interactiveSeq">
+              <p:cTn id="16" restart="whenNotActive" fill="hold" evtFilter="cancelBubble" nodeType="interactiveSeq">
                 <p:stCondLst>
                   <p:cond evt="onClick" delay="0">
                     <p:tgtEl>
@@ -4708,26 +5892,26 @@
                 </p:endSync>
                 <p:childTnLst>
                   <p:par>
-                    <p:cTn id="9" fill="hold">
+                    <p:cTn id="17" fill="hold">
                       <p:stCondLst>
                         <p:cond delay="0"/>
                       </p:stCondLst>
                       <p:childTnLst>
                         <p:par>
-                          <p:cTn id="10" fill="hold">
+                          <p:cTn id="18" fill="hold">
                             <p:stCondLst>
                               <p:cond delay="0"/>
                             </p:stCondLst>
                             <p:childTnLst>
                               <p:par>
-                                <p:cTn id="11" presetID="2" presetClass="mediacall" presetSubtype="0" fill="hold" nodeType="clickEffect">
+                                <p:cTn id="19" presetID="2" presetClass="mediacall" presetSubtype="0" fill="hold" nodeType="clickEffect">
                                   <p:stCondLst>
                                     <p:cond delay="0"/>
                                   </p:stCondLst>
                                   <p:childTnLst>
                                     <p:cmd type="call" cmd="togglePause">
                                       <p:cBhvr>
-                                        <p:cTn id="12" dur="1" fill="hold"/>
+                                        <p:cTn id="20" dur="1" fill="hold"/>
                                         <p:tgtEl>
                                           <p:spTgt spid="16"/>
                                         </p:tgtEl>
@@ -4756,197 +5940,11 @@
         </p:cTn>
       </p:par>
     </p:tnLst>
+    <p:bldLst>
+      <p:bldP spid="26" grpId="0"/>
+      <p:bldP spid="27" grpId="0"/>
+    </p:bldLst>
   </p:timing>
-</p:sld>
-</file>
-
-<file path=ppt/slides/slide5.xml><?xml version="1.0" encoding="utf-8"?>
-<p:sld xmlns:a="http://schemas.openxmlformats.org/drawingml/2006/main" xmlns:r="http://schemas.openxmlformats.org/officeDocument/2006/relationships" xmlns:p="http://schemas.openxmlformats.org/presentationml/2006/main">
-  <p:cSld>
-    <p:spTree>
-      <p:nvGrpSpPr>
-        <p:cNvPr id="1" name=""/>
-        <p:cNvGrpSpPr/>
-        <p:nvPr/>
-      </p:nvGrpSpPr>
-      <p:grpSpPr>
-        <a:xfrm>
-          <a:off x="0" y="0"/>
-          <a:ext cx="0" cy="0"/>
-          <a:chOff x="0" y="0"/>
-          <a:chExt cx="0" cy="0"/>
-        </a:xfrm>
-      </p:grpSpPr>
-      <p:sp>
-        <p:nvSpPr>
-          <p:cNvPr id="2" name="Title 1">
-            <a:extLst>
-              <a:ext uri="{FF2B5EF4-FFF2-40B4-BE49-F238E27FC236}">
-                <a16:creationId xmlns:a16="http://schemas.microsoft.com/office/drawing/2014/main" id="{785D7815-20B9-B94D-B917-A04C1D945E10}"/>
-              </a:ext>
-            </a:extLst>
-          </p:cNvPr>
-          <p:cNvSpPr>
-            <a:spLocks noGrp="1"/>
-          </p:cNvSpPr>
-          <p:nvPr>
-            <p:ph type="title"/>
-          </p:nvPr>
-        </p:nvSpPr>
-        <p:spPr/>
-        <p:txBody>
-          <a:bodyPr/>
-          <a:lstStyle/>
-          <a:p>
-            <a:endParaRPr lang="en-US"/>
-          </a:p>
-        </p:txBody>
-      </p:sp>
-      <p:sp>
-        <p:nvSpPr>
-          <p:cNvPr id="3" name="Content Placeholder 2">
-            <a:extLst>
-              <a:ext uri="{FF2B5EF4-FFF2-40B4-BE49-F238E27FC236}">
-                <a16:creationId xmlns:a16="http://schemas.microsoft.com/office/drawing/2014/main" id="{2F445386-5884-4C44-BDD9-9327896537D4}"/>
-              </a:ext>
-            </a:extLst>
-          </p:cNvPr>
-          <p:cNvSpPr>
-            <a:spLocks noGrp="1"/>
-          </p:cNvSpPr>
-          <p:nvPr>
-            <p:ph idx="1"/>
-          </p:nvPr>
-        </p:nvSpPr>
-        <p:spPr/>
-        <p:txBody>
-          <a:bodyPr/>
-          <a:lstStyle/>
-          <a:p>
-            <a:endParaRPr lang="en-US"/>
-          </a:p>
-        </p:txBody>
-      </p:sp>
-      <p:sp>
-        <p:nvSpPr>
-          <p:cNvPr id="4" name="Text Placeholder 3">
-            <a:extLst>
-              <a:ext uri="{FF2B5EF4-FFF2-40B4-BE49-F238E27FC236}">
-                <a16:creationId xmlns:a16="http://schemas.microsoft.com/office/drawing/2014/main" id="{08FACDC9-11D2-6C48-B31D-AAB249A82BD2}"/>
-              </a:ext>
-            </a:extLst>
-          </p:cNvPr>
-          <p:cNvSpPr>
-            <a:spLocks noGrp="1"/>
-          </p:cNvSpPr>
-          <p:nvPr>
-            <p:ph type="body" sz="half" idx="2"/>
-          </p:nvPr>
-        </p:nvSpPr>
-        <p:spPr/>
-        <p:txBody>
-          <a:bodyPr/>
-          <a:lstStyle/>
-          <a:p>
-            <a:endParaRPr lang="en-US"/>
-          </a:p>
-        </p:txBody>
-      </p:sp>
-      <p:sp>
-        <p:nvSpPr>
-          <p:cNvPr id="5" name="Date Placeholder 4">
-            <a:extLst>
-              <a:ext uri="{FF2B5EF4-FFF2-40B4-BE49-F238E27FC236}">
-                <a16:creationId xmlns:a16="http://schemas.microsoft.com/office/drawing/2014/main" id="{A6FAB6BD-10F6-184F-8DE4-873326967BB2}"/>
-              </a:ext>
-            </a:extLst>
-          </p:cNvPr>
-          <p:cNvSpPr>
-            <a:spLocks noGrp="1"/>
-          </p:cNvSpPr>
-          <p:nvPr>
-            <p:ph type="dt" sz="half" idx="10"/>
-          </p:nvPr>
-        </p:nvSpPr>
-        <p:spPr/>
-        <p:txBody>
-          <a:bodyPr/>
-          <a:lstStyle/>
-          <a:p>
-            <a:r>
-              <a:rPr lang="en-US"/>
-              <a:t>21 June 2021</a:t>
-            </a:r>
-          </a:p>
-        </p:txBody>
-      </p:sp>
-      <p:sp>
-        <p:nvSpPr>
-          <p:cNvPr id="6" name="Footer Placeholder 5">
-            <a:extLst>
-              <a:ext uri="{FF2B5EF4-FFF2-40B4-BE49-F238E27FC236}">
-                <a16:creationId xmlns:a16="http://schemas.microsoft.com/office/drawing/2014/main" id="{EB0EC472-B84A-3A4B-A298-ACEF25BA43C7}"/>
-              </a:ext>
-            </a:extLst>
-          </p:cNvPr>
-          <p:cNvSpPr>
-            <a:spLocks noGrp="1"/>
-          </p:cNvSpPr>
-          <p:nvPr>
-            <p:ph type="ftr" sz="quarter" idx="11"/>
-          </p:nvPr>
-        </p:nvSpPr>
-        <p:spPr/>
-        <p:txBody>
-          <a:bodyPr/>
-          <a:lstStyle/>
-          <a:p>
-            <a:r>
-              <a:rPr lang="en-US"/>
-              <a:t>Mykhaylo (Mike) Shumko | aurora-asi-lib | 2021 CEDAR Workshop</a:t>
-            </a:r>
-          </a:p>
-        </p:txBody>
-      </p:sp>
-      <p:sp>
-        <p:nvSpPr>
-          <p:cNvPr id="7" name="Slide Number Placeholder 6">
-            <a:extLst>
-              <a:ext uri="{FF2B5EF4-FFF2-40B4-BE49-F238E27FC236}">
-                <a16:creationId xmlns:a16="http://schemas.microsoft.com/office/drawing/2014/main" id="{712EDF0F-84F9-974F-961F-6FFA002B929A}"/>
-              </a:ext>
-            </a:extLst>
-          </p:cNvPr>
-          <p:cNvSpPr>
-            <a:spLocks noGrp="1"/>
-          </p:cNvSpPr>
-          <p:nvPr>
-            <p:ph type="sldNum" sz="quarter" idx="12"/>
-          </p:nvPr>
-        </p:nvSpPr>
-        <p:spPr/>
-        <p:txBody>
-          <a:bodyPr/>
-          <a:lstStyle/>
-          <a:p>
-            <a:fld id="{5FE5D21B-D093-CC4D-9CB2-6B9391E84221}" type="slidenum">
-              <a:rPr lang="en-US" smtClean="0"/>
-              <a:t>5</a:t>
-            </a:fld>
-            <a:endParaRPr lang="en-US"/>
-          </a:p>
-        </p:txBody>
-      </p:sp>
-    </p:spTree>
-    <p:extLst>
-      <p:ext uri="{BB962C8B-B14F-4D97-AF65-F5344CB8AC3E}">
-        <p14:creationId xmlns:p14="http://schemas.microsoft.com/office/powerpoint/2010/main" val="3355908863"/>
-      </p:ext>
-    </p:extLst>
-  </p:cSld>
-  <p:clrMapOvr>
-    <a:masterClrMapping/>
-  </p:clrMapOvr>
 </p:sld>
 </file>
 
@@ -4969,18 +5967,18 @@
       </p:grpSpPr>
       <p:sp>
         <p:nvSpPr>
-          <p:cNvPr id="2" name="Title 1">
-            <a:extLst>
-              <a:ext uri="{FF2B5EF4-FFF2-40B4-BE49-F238E27FC236}">
-                <a16:creationId xmlns:a16="http://schemas.microsoft.com/office/drawing/2014/main" id="{2ACD5CD7-7119-3E4C-91C5-7C0F9EA39467}"/>
-              </a:ext>
-            </a:extLst>
-          </p:cNvPr>
-          <p:cNvSpPr>
-            <a:spLocks noGrp="1"/>
-          </p:cNvSpPr>
-          <p:nvPr>
-            <p:ph type="title"/>
+          <p:cNvPr id="4" name="Date Placeholder 3">
+            <a:extLst>
+              <a:ext uri="{FF2B5EF4-FFF2-40B4-BE49-F238E27FC236}">
+                <a16:creationId xmlns:a16="http://schemas.microsoft.com/office/drawing/2014/main" id="{46C4E898-1C82-6840-B020-B0B623543BC0}"/>
+              </a:ext>
+            </a:extLst>
+          </p:cNvPr>
+          <p:cNvSpPr>
+            <a:spLocks noGrp="1"/>
+          </p:cNvSpPr>
+          <p:nvPr>
+            <p:ph type="dt" sz="half" idx="10"/>
           </p:nvPr>
         </p:nvSpPr>
         <p:spPr/>
@@ -4990,25 +5988,25 @@
           <a:p>
             <a:r>
               <a:rPr lang="en-US" dirty="0"/>
-              <a:t>Motivation---we want to make this as easy as possible. </a:t>
-            </a:r>
-          </a:p>
-        </p:txBody>
-      </p:sp>
-      <p:sp>
-        <p:nvSpPr>
-          <p:cNvPr id="3" name="Content Placeholder 2">
-            <a:extLst>
-              <a:ext uri="{FF2B5EF4-FFF2-40B4-BE49-F238E27FC236}">
-                <a16:creationId xmlns:a16="http://schemas.microsoft.com/office/drawing/2014/main" id="{B0B54C1C-A948-3E40-95FD-D9E55D3C44DB}"/>
-              </a:ext>
-            </a:extLst>
-          </p:cNvPr>
-          <p:cNvSpPr>
-            <a:spLocks noGrp="1"/>
-          </p:cNvSpPr>
-          <p:nvPr>
-            <p:ph idx="1"/>
+              <a:t>21 June 2021</a:t>
+            </a:r>
+          </a:p>
+        </p:txBody>
+      </p:sp>
+      <p:sp>
+        <p:nvSpPr>
+          <p:cNvPr id="5" name="Footer Placeholder 4">
+            <a:extLst>
+              <a:ext uri="{FF2B5EF4-FFF2-40B4-BE49-F238E27FC236}">
+                <a16:creationId xmlns:a16="http://schemas.microsoft.com/office/drawing/2014/main" id="{336FEAAC-A88C-6C4B-858B-219BAD7D40EF}"/>
+              </a:ext>
+            </a:extLst>
+          </p:cNvPr>
+          <p:cNvSpPr>
+            <a:spLocks noGrp="1"/>
+          </p:cNvSpPr>
+          <p:nvPr>
+            <p:ph type="ftr" sz="quarter" idx="11"/>
           </p:nvPr>
         </p:nvSpPr>
         <p:spPr/>
@@ -5018,72 +6016,7 @@
           <a:p>
             <a:r>
               <a:rPr lang="en-US" dirty="0"/>
-              <a:t>The most usable (and fun!?) python libraries have one central class:</a:t>
-            </a:r>
-          </a:p>
-          <a:p>
-            <a:pPr lvl="1"/>
-            <a:r>
-              <a:rPr lang="en-US" dirty="0" err="1"/>
-              <a:t>Numpy</a:t>
-            </a:r>
-            <a:r>
-              <a:rPr lang="en-US" dirty="0"/>
-              <a:t> -&gt; array</a:t>
-            </a:r>
-          </a:p>
-          <a:p>
-            <a:pPr lvl="1"/>
-            <a:r>
-              <a:rPr lang="en-US" dirty="0"/>
-              <a:t>Pandas -&gt; </a:t>
-            </a:r>
-            <a:r>
-              <a:rPr lang="en-US" dirty="0" err="1"/>
-              <a:t>dataframe</a:t>
-            </a:r>
-            <a:endParaRPr lang="en-US" dirty="0"/>
-          </a:p>
-          <a:p>
-            <a:pPr lvl="1"/>
-            <a:r>
-              <a:rPr lang="en-US" dirty="0" err="1"/>
-              <a:t>Pysat</a:t>
-            </a:r>
-            <a:r>
-              <a:rPr lang="en-US" dirty="0"/>
-              <a:t> -&gt; Instrument</a:t>
-            </a:r>
-          </a:p>
-          <a:p>
-            <a:pPr lvl="1"/>
-            <a:r>
-              <a:rPr lang="en-US" dirty="0"/>
-              <a:t>Beautiful Soup -&gt; </a:t>
-            </a:r>
-            <a:r>
-              <a:rPr lang="en-US" dirty="0" err="1"/>
-              <a:t>BeautifulSoup</a:t>
-            </a:r>
-            <a:endParaRPr lang="en-US" dirty="0"/>
-          </a:p>
-          <a:p>
-            <a:pPr marL="457200" lvl="1" indent="0">
-              <a:buNone/>
-            </a:pPr>
-            <a:endParaRPr lang="en-US" dirty="0"/>
-          </a:p>
-          <a:p>
-            <a:r>
-              <a:rPr lang="en-US" dirty="0"/>
-              <a:t>And NOW:</a:t>
-            </a:r>
-          </a:p>
-          <a:p>
-            <a:pPr lvl="1"/>
-            <a:r>
-              <a:rPr lang="en-US" dirty="0"/>
-              <a:t>aurora-</a:t>
+              <a:t>Mykhaylo (Mike) Shumko | aurora-</a:t>
             </a:r>
             <a:r>
               <a:rPr lang="en-US" dirty="0" err="1"/>
@@ -5091,75 +6024,6 @@
             </a:r>
             <a:r>
               <a:rPr lang="en-US" dirty="0"/>
-              <a:t>-lib -&gt; Imager</a:t>
-            </a:r>
-          </a:p>
-        </p:txBody>
-      </p:sp>
-      <p:sp>
-        <p:nvSpPr>
-          <p:cNvPr id="4" name="Date Placeholder 3">
-            <a:extLst>
-              <a:ext uri="{FF2B5EF4-FFF2-40B4-BE49-F238E27FC236}">
-                <a16:creationId xmlns:a16="http://schemas.microsoft.com/office/drawing/2014/main" id="{B9104F61-0C1B-6242-B43A-BE9547ABCE32}"/>
-              </a:ext>
-            </a:extLst>
-          </p:cNvPr>
-          <p:cNvSpPr>
-            <a:spLocks noGrp="1"/>
-          </p:cNvSpPr>
-          <p:nvPr>
-            <p:ph type="dt" sz="half" idx="10"/>
-          </p:nvPr>
-        </p:nvSpPr>
-        <p:spPr/>
-        <p:txBody>
-          <a:bodyPr/>
-          <a:lstStyle/>
-          <a:p>
-            <a:r>
-              <a:rPr lang="en-US"/>
-              <a:t>21 June 2021</a:t>
-            </a:r>
-          </a:p>
-        </p:txBody>
-      </p:sp>
-      <p:sp>
-        <p:nvSpPr>
-          <p:cNvPr id="5" name="Footer Placeholder 4">
-            <a:extLst>
-              <a:ext uri="{FF2B5EF4-FFF2-40B4-BE49-F238E27FC236}">
-                <a16:creationId xmlns:a16="http://schemas.microsoft.com/office/drawing/2014/main" id="{F4677075-2C45-324F-A507-63AC6FF05E1F}"/>
-              </a:ext>
-            </a:extLst>
-          </p:cNvPr>
-          <p:cNvSpPr>
-            <a:spLocks noGrp="1"/>
-          </p:cNvSpPr>
-          <p:nvPr>
-            <p:ph type="ftr" sz="quarter" idx="11"/>
-          </p:nvPr>
-        </p:nvSpPr>
-        <p:spPr>
-          <a:xfrm>
-            <a:off x="4038600" y="6356350"/>
-            <a:ext cx="4572000" cy="365125"/>
-          </a:xfrm>
-        </p:spPr>
-        <p:txBody>
-          <a:bodyPr/>
-          <a:lstStyle/>
-          <a:p>
-            <a:r>
-              <a:rPr lang="en-US" dirty="0"/>
-              <a:t>Mykhaylo (Mike) Shumko | aurora-</a:t>
-            </a:r>
-            <a:r>
-              <a:rPr lang="en-US" dirty="0" err="1"/>
-              <a:t>asi</a:t>
-            </a:r>
-            <a:r>
-              <a:rPr lang="en-US" dirty="0"/>
               <a:t>-lib | 2021 CEDAR Workshop</a:t>
             </a:r>
           </a:p>
@@ -5170,7 +6034,7 @@
           <p:cNvPr id="6" name="Slide Number Placeholder 5">
             <a:extLst>
               <a:ext uri="{FF2B5EF4-FFF2-40B4-BE49-F238E27FC236}">
-                <a16:creationId xmlns:a16="http://schemas.microsoft.com/office/drawing/2014/main" id="{8A27F1EF-41D1-224B-B36C-7CD81B21BC74}"/>
+                <a16:creationId xmlns:a16="http://schemas.microsoft.com/office/drawing/2014/main" id="{FAC691CF-3298-1344-8B16-27A7376F6F76}"/>
               </a:ext>
             </a:extLst>
           </p:cNvPr>
@@ -5194,16 +6058,367 @@
           </a:p>
         </p:txBody>
       </p:sp>
+      <p:sp>
+        <p:nvSpPr>
+          <p:cNvPr id="20" name="TextBox 19">
+            <a:extLst>
+              <a:ext uri="{FF2B5EF4-FFF2-40B4-BE49-F238E27FC236}">
+                <a16:creationId xmlns:a16="http://schemas.microsoft.com/office/drawing/2014/main" id="{EF20BE0D-408D-524D-A428-9300B661EC2D}"/>
+              </a:ext>
+            </a:extLst>
+          </p:cNvPr>
+          <p:cNvSpPr txBox="1"/>
+          <p:nvPr/>
+        </p:nvSpPr>
+        <p:spPr>
+          <a:xfrm>
+            <a:off x="678426" y="339213"/>
+            <a:ext cx="5869858" cy="830997"/>
+          </a:xfrm>
+          <a:prstGeom prst="rect">
+            <a:avLst/>
+          </a:prstGeom>
+          <a:noFill/>
+        </p:spPr>
+        <p:txBody>
+          <a:bodyPr wrap="square" rtlCol="0">
+            <a:spAutoFit/>
+          </a:bodyPr>
+          <a:lstStyle/>
+          <a:p>
+            <a:r>
+              <a:rPr lang="en-US" sz="4800" dirty="0"/>
+              <a:t>What can it do?</a:t>
+            </a:r>
+          </a:p>
+        </p:txBody>
+      </p:sp>
+      <p:sp>
+        <p:nvSpPr>
+          <p:cNvPr id="2" name="TextBox 1">
+            <a:extLst>
+              <a:ext uri="{FF2B5EF4-FFF2-40B4-BE49-F238E27FC236}">
+                <a16:creationId xmlns:a16="http://schemas.microsoft.com/office/drawing/2014/main" id="{EB3F7F3B-501B-F146-B33A-3609CAB8F5F6}"/>
+              </a:ext>
+            </a:extLst>
+          </p:cNvPr>
+          <p:cNvSpPr txBox="1"/>
+          <p:nvPr/>
+        </p:nvSpPr>
+        <p:spPr>
+          <a:xfrm>
+            <a:off x="353961" y="1519084"/>
+            <a:ext cx="5589639" cy="2308324"/>
+          </a:xfrm>
+          <a:prstGeom prst="rect">
+            <a:avLst/>
+          </a:prstGeom>
+          <a:noFill/>
+        </p:spPr>
+        <p:txBody>
+          <a:bodyPr wrap="square" rtlCol="0">
+            <a:spAutoFit/>
+          </a:bodyPr>
+          <a:lstStyle/>
+          <a:p>
+            <a:r>
+              <a:rPr lang="en-US" sz="2400" dirty="0"/>
+              <a:t>Load data</a:t>
+            </a:r>
+          </a:p>
+          <a:p>
+            <a:r>
+              <a:rPr lang="en-US" sz="2400" dirty="0"/>
+              <a:t>	</a:t>
+            </a:r>
+            <a:r>
+              <a:rPr lang="en-US" sz="2400" dirty="0" err="1"/>
+              <a:t>asilib.load_img</a:t>
+            </a:r>
+            <a:r>
+              <a:rPr lang="en-US" sz="2400" dirty="0"/>
+              <a:t>()</a:t>
+            </a:r>
+          </a:p>
+          <a:p>
+            <a:r>
+              <a:rPr lang="en-US" sz="2400" dirty="0"/>
+              <a:t>	</a:t>
+            </a:r>
+            <a:r>
+              <a:rPr lang="en-US" sz="2400" dirty="0" err="1"/>
+              <a:t>asilib.load_cal</a:t>
+            </a:r>
+            <a:r>
+              <a:rPr lang="en-US" sz="2400" dirty="0"/>
+              <a:t>()</a:t>
+            </a:r>
+          </a:p>
+          <a:p>
+            <a:endParaRPr lang="en-US" sz="2400" dirty="0"/>
+          </a:p>
+          <a:p>
+            <a:r>
+              <a:rPr lang="en-US" sz="2400" dirty="0"/>
+              <a:t>If a file is not found, one will be automatically downloaded!</a:t>
+            </a:r>
+          </a:p>
+        </p:txBody>
+      </p:sp>
+      <p:sp>
+        <p:nvSpPr>
+          <p:cNvPr id="10" name="TextBox 9">
+            <a:extLst>
+              <a:ext uri="{FF2B5EF4-FFF2-40B4-BE49-F238E27FC236}">
+                <a16:creationId xmlns:a16="http://schemas.microsoft.com/office/drawing/2014/main" id="{D3A18F21-26D6-DB40-92AC-CB6B420593E2}"/>
+              </a:ext>
+            </a:extLst>
+          </p:cNvPr>
+          <p:cNvSpPr txBox="1"/>
+          <p:nvPr/>
+        </p:nvSpPr>
+        <p:spPr>
+          <a:xfrm>
+            <a:off x="353960" y="4122383"/>
+            <a:ext cx="5589639" cy="1938992"/>
+          </a:xfrm>
+          <a:prstGeom prst="rect">
+            <a:avLst/>
+          </a:prstGeom>
+          <a:noFill/>
+        </p:spPr>
+        <p:txBody>
+          <a:bodyPr wrap="square" rtlCol="0">
+            <a:spAutoFit/>
+          </a:bodyPr>
+          <a:lstStyle/>
+          <a:p>
+            <a:r>
+              <a:rPr lang="en-US" sz="2400" dirty="0"/>
+              <a:t>Bulk download data</a:t>
+            </a:r>
+          </a:p>
+          <a:p>
+            <a:r>
+              <a:rPr lang="en-US" sz="2400" dirty="0"/>
+              <a:t>	</a:t>
+            </a:r>
+            <a:r>
+              <a:rPr lang="en-US" sz="2400" dirty="0" err="1"/>
+              <a:t>asilib.download_themis_cal</a:t>
+            </a:r>
+            <a:r>
+              <a:rPr lang="en-US" sz="2400" dirty="0"/>
+              <a:t>()</a:t>
+            </a:r>
+          </a:p>
+          <a:p>
+            <a:r>
+              <a:rPr lang="en-US" sz="2400" dirty="0"/>
+              <a:t>	</a:t>
+            </a:r>
+            <a:r>
+              <a:rPr lang="en-US" sz="2400" dirty="0" err="1"/>
+              <a:t>asilib.download_themis_img</a:t>
+            </a:r>
+            <a:r>
+              <a:rPr lang="en-US" sz="2400" dirty="0"/>
+              <a:t>()</a:t>
+            </a:r>
+          </a:p>
+          <a:p>
+            <a:r>
+              <a:rPr lang="en-US" sz="2400" dirty="0"/>
+              <a:t>	</a:t>
+            </a:r>
+            <a:r>
+              <a:rPr lang="en-US" sz="2400" dirty="0" err="1"/>
+              <a:t>asilib.download_rego_cal</a:t>
+            </a:r>
+            <a:r>
+              <a:rPr lang="en-US" sz="2400" dirty="0"/>
+              <a:t>()</a:t>
+            </a:r>
+          </a:p>
+          <a:p>
+            <a:r>
+              <a:rPr lang="en-US" sz="2400" dirty="0"/>
+              <a:t>	</a:t>
+            </a:r>
+            <a:r>
+              <a:rPr lang="en-US" sz="2400" dirty="0" err="1"/>
+              <a:t>asilib.download_rego_img</a:t>
+            </a:r>
+            <a:r>
+              <a:rPr lang="en-US" sz="2400" dirty="0"/>
+              <a:t>()</a:t>
+            </a:r>
+          </a:p>
+        </p:txBody>
+      </p:sp>
+      <p:pic>
+        <p:nvPicPr>
+          <p:cNvPr id="9" name="Content Placeholder 8" descr="A screenshot of a computer&#10;&#10;Description automatically generated with low confidence">
+            <a:extLst>
+              <a:ext uri="{FF2B5EF4-FFF2-40B4-BE49-F238E27FC236}">
+                <a16:creationId xmlns:a16="http://schemas.microsoft.com/office/drawing/2014/main" id="{3AD7BC3F-493B-DD4E-9114-843E54852160}"/>
+              </a:ext>
+            </a:extLst>
+          </p:cNvPr>
+          <p:cNvPicPr>
+            <a:picLocks noGrp="1" noChangeAspect="1"/>
+          </p:cNvPicPr>
+          <p:nvPr>
+            <p:ph idx="1"/>
+          </p:nvPr>
+        </p:nvPicPr>
+        <p:blipFill>
+          <a:blip r:embed="rId2"/>
+          <a:stretch>
+            <a:fillRect/>
+          </a:stretch>
+        </p:blipFill>
+        <p:spPr>
+          <a:xfrm>
+            <a:off x="5943599" y="1076902"/>
+            <a:ext cx="6172200" cy="4629150"/>
+          </a:xfrm>
+        </p:spPr>
+      </p:pic>
     </p:spTree>
     <p:extLst>
       <p:ext uri="{BB962C8B-B14F-4D97-AF65-F5344CB8AC3E}">
-        <p14:creationId xmlns:p14="http://schemas.microsoft.com/office/powerpoint/2010/main" val="1324660906"/>
+        <p14:creationId xmlns:p14="http://schemas.microsoft.com/office/powerpoint/2010/main" val="2659172986"/>
       </p:ext>
     </p:extLst>
   </p:cSld>
   <p:clrMapOvr>
     <a:masterClrMapping/>
   </p:clrMapOvr>
+  <p:timing>
+    <p:tnLst>
+      <p:par>
+        <p:cTn id="1" dur="indefinite" restart="never" nodeType="tmRoot">
+          <p:childTnLst>
+            <p:seq concurrent="1" nextAc="seek">
+              <p:cTn id="2" dur="indefinite" nodeType="mainSeq">
+                <p:childTnLst>
+                  <p:par>
+                    <p:cTn id="3" fill="hold">
+                      <p:stCondLst>
+                        <p:cond delay="indefinite"/>
+                      </p:stCondLst>
+                      <p:childTnLst>
+                        <p:par>
+                          <p:cTn id="4" fill="hold">
+                            <p:stCondLst>
+                              <p:cond delay="0"/>
+                            </p:stCondLst>
+                            <p:childTnLst>
+                              <p:par>
+                                <p:cTn id="5" presetID="1" presetClass="entr" presetSubtype="0" fill="hold" grpId="0" nodeType="clickEffect">
+                                  <p:stCondLst>
+                                    <p:cond delay="0"/>
+                                  </p:stCondLst>
+                                  <p:childTnLst>
+                                    <p:set>
+                                      <p:cBhvr>
+                                        <p:cTn id="6" dur="1" fill="hold">
+                                          <p:stCondLst>
+                                            <p:cond delay="0"/>
+                                          </p:stCondLst>
+                                        </p:cTn>
+                                        <p:tgtEl>
+                                          <p:spTgt spid="2"/>
+                                        </p:tgtEl>
+                                        <p:attrNameLst>
+                                          <p:attrName>style.visibility</p:attrName>
+                                        </p:attrNameLst>
+                                      </p:cBhvr>
+                                      <p:to>
+                                        <p:strVal val="visible"/>
+                                      </p:to>
+                                    </p:set>
+                                  </p:childTnLst>
+                                </p:cTn>
+                              </p:par>
+                            </p:childTnLst>
+                          </p:cTn>
+                        </p:par>
+                      </p:childTnLst>
+                    </p:cTn>
+                  </p:par>
+                  <p:par>
+                    <p:cTn id="7" fill="hold">
+                      <p:stCondLst>
+                        <p:cond delay="indefinite"/>
+                      </p:stCondLst>
+                      <p:childTnLst>
+                        <p:par>
+                          <p:cTn id="8" fill="hold">
+                            <p:stCondLst>
+                              <p:cond delay="0"/>
+                            </p:stCondLst>
+                            <p:childTnLst>
+                              <p:par>
+                                <p:cTn id="9" presetID="1" presetClass="entr" presetSubtype="0" fill="hold" grpId="0" nodeType="clickEffect">
+                                  <p:stCondLst>
+                                    <p:cond delay="0"/>
+                                  </p:stCondLst>
+                                  <p:childTnLst>
+                                    <p:set>
+                                      <p:cBhvr>
+                                        <p:cTn id="10" dur="1" fill="hold">
+                                          <p:stCondLst>
+                                            <p:cond delay="0"/>
+                                          </p:stCondLst>
+                                        </p:cTn>
+                                        <p:tgtEl>
+                                          <p:spTgt spid="10"/>
+                                        </p:tgtEl>
+                                        <p:attrNameLst>
+                                          <p:attrName>style.visibility</p:attrName>
+                                        </p:attrNameLst>
+                                      </p:cBhvr>
+                                      <p:to>
+                                        <p:strVal val="visible"/>
+                                      </p:to>
+                                    </p:set>
+                                  </p:childTnLst>
+                                </p:cTn>
+                              </p:par>
+                            </p:childTnLst>
+                          </p:cTn>
+                        </p:par>
+                      </p:childTnLst>
+                    </p:cTn>
+                  </p:par>
+                </p:childTnLst>
+              </p:cTn>
+              <p:prevCondLst>
+                <p:cond evt="onPrev" delay="0">
+                  <p:tgtEl>
+                    <p:sldTgt/>
+                  </p:tgtEl>
+                </p:cond>
+              </p:prevCondLst>
+              <p:nextCondLst>
+                <p:cond evt="onNext" delay="0">
+                  <p:tgtEl>
+                    <p:sldTgt/>
+                  </p:tgtEl>
+                </p:cond>
+              </p:nextCondLst>
+            </p:seq>
+          </p:childTnLst>
+        </p:cTn>
+      </p:par>
+    </p:tnLst>
+    <p:bldLst>
+      <p:bldP spid="2" grpId="0"/>
+      <p:bldP spid="10" grpId="0"/>
+    </p:bldLst>
+  </p:timing>
 </p:sld>
 </file>
 
@@ -5229,7 +6444,7 @@
           <p:cNvPr id="2" name="Title 1">
             <a:extLst>
               <a:ext uri="{FF2B5EF4-FFF2-40B4-BE49-F238E27FC236}">
-                <a16:creationId xmlns:a16="http://schemas.microsoft.com/office/drawing/2014/main" id="{2A45E70C-41F0-F446-981F-6874DAC75985}"/>
+                <a16:creationId xmlns:a16="http://schemas.microsoft.com/office/drawing/2014/main" id="{2ACD5CD7-7119-3E4C-91C5-7C0F9EA39467}"/>
               </a:ext>
             </a:extLst>
           </p:cNvPr>
@@ -5247,7 +6462,7 @@
           <a:p>
             <a:r>
               <a:rPr lang="en-US" dirty="0"/>
-              <a:t>How can I use it?</a:t>
+              <a:t>One class to rule them all</a:t>
             </a:r>
           </a:p>
         </p:txBody>
@@ -5257,7 +6472,7 @@
           <p:cNvPr id="3" name="Content Placeholder 2">
             <a:extLst>
               <a:ext uri="{FF2B5EF4-FFF2-40B4-BE49-F238E27FC236}">
-                <a16:creationId xmlns:a16="http://schemas.microsoft.com/office/drawing/2014/main" id="{887AE6D0-A308-AA43-8518-FF9E9CC1E300}"/>
+                <a16:creationId xmlns:a16="http://schemas.microsoft.com/office/drawing/2014/main" id="{B0B54C1C-A948-3E40-95FD-D9E55D3C44DB}"/>
               </a:ext>
             </a:extLst>
           </p:cNvPr>
@@ -5275,97 +6490,122 @@
           <a:p>
             <a:r>
               <a:rPr lang="en-US" dirty="0"/>
-              <a:t>Documentation is hosted at: </a:t>
-            </a:r>
-            <a:r>
-              <a:rPr lang="en-US" dirty="0">
-                <a:hlinkClick r:id="rId2"/>
-              </a:rPr>
-              <a:t>https://aurora-asi-lib.readthedocs.io</a:t>
+              <a:t>The most usable (and fun!?) python libraries have a central class:</a:t>
+            </a:r>
+          </a:p>
+          <a:p>
+            <a:pPr lvl="1"/>
+            <a:r>
+              <a:rPr lang="en-US" dirty="0" err="1"/>
+              <a:t>numpy.array</a:t>
             </a:r>
             <a:endParaRPr lang="en-US" dirty="0"/>
           </a:p>
           <a:p>
+            <a:pPr lvl="1"/>
+            <a:r>
+              <a:rPr lang="en-US" dirty="0" err="1"/>
+              <a:t>pandas.DataFrame</a:t>
+            </a:r>
+            <a:endParaRPr lang="en-US" dirty="0"/>
+          </a:p>
+          <a:p>
+            <a:pPr lvl="1"/>
+            <a:r>
+              <a:rPr lang="en-US" dirty="0" err="1"/>
+              <a:t>xarray.DataArray</a:t>
+            </a:r>
+            <a:endParaRPr lang="en-US" dirty="0"/>
+          </a:p>
+          <a:p>
+            <a:pPr lvl="1"/>
+            <a:r>
+              <a:rPr lang="en-US" dirty="0" err="1"/>
+              <a:t>pysat.Instrument</a:t>
+            </a:r>
+            <a:endParaRPr lang="en-US" dirty="0"/>
+          </a:p>
+          <a:p>
+            <a:pPr lvl="1"/>
             <a:r>
               <a:rPr lang="en-US" dirty="0"/>
-              <a:t>And on </a:t>
+              <a:t>bs4.BeautifulSoup</a:t>
+            </a:r>
+          </a:p>
+          <a:p>
+            <a:pPr lvl="1"/>
+            <a:r>
+              <a:rPr lang="en-US" dirty="0"/>
+              <a:t>…</a:t>
+            </a:r>
+          </a:p>
+        </p:txBody>
+      </p:sp>
+      <p:sp>
+        <p:nvSpPr>
+          <p:cNvPr id="4" name="Date Placeholder 3">
+            <a:extLst>
+              <a:ext uri="{FF2B5EF4-FFF2-40B4-BE49-F238E27FC236}">
+                <a16:creationId xmlns:a16="http://schemas.microsoft.com/office/drawing/2014/main" id="{B9104F61-0C1B-6242-B43A-BE9547ABCE32}"/>
+              </a:ext>
+            </a:extLst>
+          </p:cNvPr>
+          <p:cNvSpPr>
+            <a:spLocks noGrp="1"/>
+          </p:cNvSpPr>
+          <p:nvPr>
+            <p:ph type="dt" sz="half" idx="10"/>
+          </p:nvPr>
+        </p:nvSpPr>
+        <p:spPr/>
+        <p:txBody>
+          <a:bodyPr/>
+          <a:lstStyle/>
+          <a:p>
+            <a:r>
+              <a:rPr lang="en-US"/>
+              <a:t>21 June 2021</a:t>
+            </a:r>
+          </a:p>
+        </p:txBody>
+      </p:sp>
+      <p:sp>
+        <p:nvSpPr>
+          <p:cNvPr id="5" name="Footer Placeholder 4">
+            <a:extLst>
+              <a:ext uri="{FF2B5EF4-FFF2-40B4-BE49-F238E27FC236}">
+                <a16:creationId xmlns:a16="http://schemas.microsoft.com/office/drawing/2014/main" id="{F4677075-2C45-324F-A507-63AC6FF05E1F}"/>
+              </a:ext>
+            </a:extLst>
+          </p:cNvPr>
+          <p:cNvSpPr>
+            <a:spLocks noGrp="1"/>
+          </p:cNvSpPr>
+          <p:nvPr>
+            <p:ph type="ftr" sz="quarter" idx="11"/>
+          </p:nvPr>
+        </p:nvSpPr>
+        <p:spPr>
+          <a:xfrm>
+            <a:off x="4038600" y="6356350"/>
+            <a:ext cx="4572000" cy="365125"/>
+          </a:xfrm>
+        </p:spPr>
+        <p:txBody>
+          <a:bodyPr/>
+          <a:lstStyle/>
+          <a:p>
+            <a:r>
+              <a:rPr lang="en-US" dirty="0"/>
+              <a:t>Mykhaylo (Mike) Shumko | aurora-</a:t>
             </a:r>
             <a:r>
               <a:rPr lang="en-US" dirty="0" err="1"/>
-              <a:t>github</a:t>
+              <a:t>asi</a:t>
             </a:r>
             <a:r>
               <a:rPr lang="en-US" dirty="0"/>
-              <a:t>: </a:t>
-            </a:r>
-            <a:r>
-              <a:rPr lang="en-US" dirty="0">
-                <a:hlinkClick r:id="rId3"/>
-              </a:rPr>
-              <a:t>https://github.com/mshumko/aurora-asi</a:t>
-            </a:r>
-            <a:r>
-              <a:rPr lang="en-US">
-                <a:hlinkClick r:id="rId3"/>
-              </a:rPr>
-              <a:t>-lib</a:t>
-            </a:r>
-            <a:endParaRPr lang="en-US"/>
-          </a:p>
-        </p:txBody>
-      </p:sp>
-      <p:sp>
-        <p:nvSpPr>
-          <p:cNvPr id="4" name="Date Placeholder 3">
-            <a:extLst>
-              <a:ext uri="{FF2B5EF4-FFF2-40B4-BE49-F238E27FC236}">
-                <a16:creationId xmlns:a16="http://schemas.microsoft.com/office/drawing/2014/main" id="{926E3BE2-876A-4B47-9593-BD77AA131C7E}"/>
-              </a:ext>
-            </a:extLst>
-          </p:cNvPr>
-          <p:cNvSpPr>
-            <a:spLocks noGrp="1"/>
-          </p:cNvSpPr>
-          <p:nvPr>
-            <p:ph type="dt" sz="half" idx="10"/>
-          </p:nvPr>
-        </p:nvSpPr>
-        <p:spPr/>
-        <p:txBody>
-          <a:bodyPr/>
-          <a:lstStyle/>
-          <a:p>
-            <a:r>
-              <a:rPr lang="en-US"/>
-              <a:t>21 June 2021</a:t>
-            </a:r>
-          </a:p>
-        </p:txBody>
-      </p:sp>
-      <p:sp>
-        <p:nvSpPr>
-          <p:cNvPr id="5" name="Footer Placeholder 4">
-            <a:extLst>
-              <a:ext uri="{FF2B5EF4-FFF2-40B4-BE49-F238E27FC236}">
-                <a16:creationId xmlns:a16="http://schemas.microsoft.com/office/drawing/2014/main" id="{139ABF6F-AAC1-2846-A256-BD33395F8135}"/>
-              </a:ext>
-            </a:extLst>
-          </p:cNvPr>
-          <p:cNvSpPr>
-            <a:spLocks noGrp="1"/>
-          </p:cNvSpPr>
-          <p:nvPr>
-            <p:ph type="ftr" sz="quarter" idx="11"/>
-          </p:nvPr>
-        </p:nvSpPr>
-        <p:spPr/>
-        <p:txBody>
-          <a:bodyPr/>
-          <a:lstStyle/>
-          <a:p>
-            <a:r>
-              <a:rPr lang="en-US"/>
-              <a:t>Mykhaylo (Mike) Shumko | aurora-asi-lib | 2021 CEDAR Workshop</a:t>
+              <a:t>-lib | 2021 CEDAR Workshop</a:t>
             </a:r>
           </a:p>
         </p:txBody>
@@ -5375,7 +6615,7 @@
           <p:cNvPr id="6" name="Slide Number Placeholder 5">
             <a:extLst>
               <a:ext uri="{FF2B5EF4-FFF2-40B4-BE49-F238E27FC236}">
-                <a16:creationId xmlns:a16="http://schemas.microsoft.com/office/drawing/2014/main" id="{5DAEC020-5D6A-BD40-84BD-ADFB9FFE112C}"/>
+                <a16:creationId xmlns:a16="http://schemas.microsoft.com/office/drawing/2014/main" id="{8A27F1EF-41D1-224B-B36C-7CD81B21BC74}"/>
               </a:ext>
             </a:extLst>
           </p:cNvPr>
@@ -5402,7 +6642,598 @@
     </p:spTree>
     <p:extLst>
       <p:ext uri="{BB962C8B-B14F-4D97-AF65-F5344CB8AC3E}">
-        <p14:creationId xmlns:p14="http://schemas.microsoft.com/office/powerpoint/2010/main" val="88996792"/>
+        <p14:creationId xmlns:p14="http://schemas.microsoft.com/office/powerpoint/2010/main" val="3996873937"/>
+      </p:ext>
+    </p:extLst>
+  </p:cSld>
+  <p:clrMapOvr>
+    <a:masterClrMapping/>
+  </p:clrMapOvr>
+</p:sld>
+</file>
+
+<file path=ppt/slides/slide8.xml><?xml version="1.0" encoding="utf-8"?>
+<p:sld xmlns:a="http://schemas.openxmlformats.org/drawingml/2006/main" xmlns:r="http://schemas.openxmlformats.org/officeDocument/2006/relationships" xmlns:p="http://schemas.openxmlformats.org/presentationml/2006/main">
+  <p:cSld>
+    <p:spTree>
+      <p:nvGrpSpPr>
+        <p:cNvPr id="1" name=""/>
+        <p:cNvGrpSpPr/>
+        <p:nvPr/>
+      </p:nvGrpSpPr>
+      <p:grpSpPr>
+        <a:xfrm>
+          <a:off x="0" y="0"/>
+          <a:ext cx="0" cy="0"/>
+          <a:chOff x="0" y="0"/>
+          <a:chExt cx="0" cy="0"/>
+        </a:xfrm>
+      </p:grpSpPr>
+      <p:sp>
+        <p:nvSpPr>
+          <p:cNvPr id="2" name="Title 1">
+            <a:extLst>
+              <a:ext uri="{FF2B5EF4-FFF2-40B4-BE49-F238E27FC236}">
+                <a16:creationId xmlns:a16="http://schemas.microsoft.com/office/drawing/2014/main" id="{2ACD5CD7-7119-3E4C-91C5-7C0F9EA39467}"/>
+              </a:ext>
+            </a:extLst>
+          </p:cNvPr>
+          <p:cNvSpPr>
+            <a:spLocks noGrp="1"/>
+          </p:cNvSpPr>
+          <p:nvPr>
+            <p:ph type="title"/>
+          </p:nvPr>
+        </p:nvSpPr>
+        <p:spPr/>
+        <p:txBody>
+          <a:bodyPr/>
+          <a:lstStyle/>
+          <a:p>
+            <a:r>
+              <a:rPr lang="en-US" dirty="0"/>
+              <a:t>One class to rule them all</a:t>
+            </a:r>
+          </a:p>
+        </p:txBody>
+      </p:sp>
+      <p:sp>
+        <p:nvSpPr>
+          <p:cNvPr id="3" name="Content Placeholder 2">
+            <a:extLst>
+              <a:ext uri="{FF2B5EF4-FFF2-40B4-BE49-F238E27FC236}">
+                <a16:creationId xmlns:a16="http://schemas.microsoft.com/office/drawing/2014/main" id="{B0B54C1C-A948-3E40-95FD-D9E55D3C44DB}"/>
+              </a:ext>
+            </a:extLst>
+          </p:cNvPr>
+          <p:cNvSpPr>
+            <a:spLocks noGrp="1"/>
+          </p:cNvSpPr>
+          <p:nvPr>
+            <p:ph idx="1"/>
+          </p:nvPr>
+        </p:nvSpPr>
+        <p:spPr/>
+        <p:txBody>
+          <a:bodyPr/>
+          <a:lstStyle/>
+          <a:p>
+            <a:r>
+              <a:rPr lang="en-US" dirty="0"/>
+              <a:t>The most usable (and fun!?) python libraries have a central class:</a:t>
+            </a:r>
+          </a:p>
+          <a:p>
+            <a:pPr lvl="1"/>
+            <a:r>
+              <a:rPr lang="en-US" dirty="0" err="1"/>
+              <a:t>numpy.array</a:t>
+            </a:r>
+            <a:endParaRPr lang="en-US" dirty="0"/>
+          </a:p>
+          <a:p>
+            <a:pPr lvl="1"/>
+            <a:r>
+              <a:rPr lang="en-US" dirty="0" err="1"/>
+              <a:t>pandas.DataFrame</a:t>
+            </a:r>
+            <a:endParaRPr lang="en-US" dirty="0"/>
+          </a:p>
+          <a:p>
+            <a:pPr lvl="1"/>
+            <a:r>
+              <a:rPr lang="en-US" dirty="0" err="1"/>
+              <a:t>xarray.DataArray</a:t>
+            </a:r>
+            <a:endParaRPr lang="en-US" dirty="0"/>
+          </a:p>
+          <a:p>
+            <a:pPr lvl="1"/>
+            <a:r>
+              <a:rPr lang="en-US" dirty="0" err="1"/>
+              <a:t>pysat.Instrument</a:t>
+            </a:r>
+            <a:endParaRPr lang="en-US" dirty="0"/>
+          </a:p>
+          <a:p>
+            <a:pPr lvl="1"/>
+            <a:r>
+              <a:rPr lang="en-US" dirty="0"/>
+              <a:t>bs4.BeautifulSoup</a:t>
+            </a:r>
+          </a:p>
+          <a:p>
+            <a:pPr lvl="1"/>
+            <a:r>
+              <a:rPr lang="en-US" dirty="0"/>
+              <a:t>…</a:t>
+            </a:r>
+          </a:p>
+          <a:p>
+            <a:r>
+              <a:rPr lang="en-US" dirty="0"/>
+              <a:t>And now:</a:t>
+            </a:r>
+          </a:p>
+          <a:p>
+            <a:pPr lvl="1"/>
+            <a:r>
+              <a:rPr lang="en-US" dirty="0"/>
+              <a:t>aurora-</a:t>
+            </a:r>
+            <a:r>
+              <a:rPr lang="en-US" dirty="0" err="1"/>
+              <a:t>asi</a:t>
+            </a:r>
+            <a:r>
+              <a:rPr lang="en-US" dirty="0"/>
+              <a:t>-lib -&gt; Imager</a:t>
+            </a:r>
+          </a:p>
+        </p:txBody>
+      </p:sp>
+      <p:sp>
+        <p:nvSpPr>
+          <p:cNvPr id="4" name="Date Placeholder 3">
+            <a:extLst>
+              <a:ext uri="{FF2B5EF4-FFF2-40B4-BE49-F238E27FC236}">
+                <a16:creationId xmlns:a16="http://schemas.microsoft.com/office/drawing/2014/main" id="{B9104F61-0C1B-6242-B43A-BE9547ABCE32}"/>
+              </a:ext>
+            </a:extLst>
+          </p:cNvPr>
+          <p:cNvSpPr>
+            <a:spLocks noGrp="1"/>
+          </p:cNvSpPr>
+          <p:nvPr>
+            <p:ph type="dt" sz="half" idx="10"/>
+          </p:nvPr>
+        </p:nvSpPr>
+        <p:spPr/>
+        <p:txBody>
+          <a:bodyPr/>
+          <a:lstStyle/>
+          <a:p>
+            <a:r>
+              <a:rPr lang="en-US"/>
+              <a:t>21 June 2021</a:t>
+            </a:r>
+          </a:p>
+        </p:txBody>
+      </p:sp>
+      <p:sp>
+        <p:nvSpPr>
+          <p:cNvPr id="5" name="Footer Placeholder 4">
+            <a:extLst>
+              <a:ext uri="{FF2B5EF4-FFF2-40B4-BE49-F238E27FC236}">
+                <a16:creationId xmlns:a16="http://schemas.microsoft.com/office/drawing/2014/main" id="{F4677075-2C45-324F-A507-63AC6FF05E1F}"/>
+              </a:ext>
+            </a:extLst>
+          </p:cNvPr>
+          <p:cNvSpPr>
+            <a:spLocks noGrp="1"/>
+          </p:cNvSpPr>
+          <p:nvPr>
+            <p:ph type="ftr" sz="quarter" idx="11"/>
+          </p:nvPr>
+        </p:nvSpPr>
+        <p:spPr>
+          <a:xfrm>
+            <a:off x="4038600" y="6356350"/>
+            <a:ext cx="4572000" cy="365125"/>
+          </a:xfrm>
+        </p:spPr>
+        <p:txBody>
+          <a:bodyPr/>
+          <a:lstStyle/>
+          <a:p>
+            <a:r>
+              <a:rPr lang="en-US" dirty="0"/>
+              <a:t>Mykhaylo (Mike) Shumko | aurora-</a:t>
+            </a:r>
+            <a:r>
+              <a:rPr lang="en-US" dirty="0" err="1"/>
+              <a:t>asi</a:t>
+            </a:r>
+            <a:r>
+              <a:rPr lang="en-US" dirty="0"/>
+              <a:t>-lib | 2021 CEDAR Workshop</a:t>
+            </a:r>
+          </a:p>
+        </p:txBody>
+      </p:sp>
+      <p:sp>
+        <p:nvSpPr>
+          <p:cNvPr id="6" name="Slide Number Placeholder 5">
+            <a:extLst>
+              <a:ext uri="{FF2B5EF4-FFF2-40B4-BE49-F238E27FC236}">
+                <a16:creationId xmlns:a16="http://schemas.microsoft.com/office/drawing/2014/main" id="{8A27F1EF-41D1-224B-B36C-7CD81B21BC74}"/>
+              </a:ext>
+            </a:extLst>
+          </p:cNvPr>
+          <p:cNvSpPr>
+            <a:spLocks noGrp="1"/>
+          </p:cNvSpPr>
+          <p:nvPr>
+            <p:ph type="sldNum" sz="quarter" idx="12"/>
+          </p:nvPr>
+        </p:nvSpPr>
+        <p:spPr/>
+        <p:txBody>
+          <a:bodyPr/>
+          <a:lstStyle/>
+          <a:p>
+            <a:fld id="{5FE5D21B-D093-CC4D-9CB2-6B9391E84221}" type="slidenum">
+              <a:rPr lang="en-US" smtClean="0"/>
+              <a:t>8</a:t>
+            </a:fld>
+            <a:endParaRPr lang="en-US"/>
+          </a:p>
+        </p:txBody>
+      </p:sp>
+    </p:spTree>
+    <p:extLst>
+      <p:ext uri="{BB962C8B-B14F-4D97-AF65-F5344CB8AC3E}">
+        <p14:creationId xmlns:p14="http://schemas.microsoft.com/office/powerpoint/2010/main" val="1643577424"/>
+      </p:ext>
+    </p:extLst>
+  </p:cSld>
+  <p:clrMapOvr>
+    <a:masterClrMapping/>
+  </p:clrMapOvr>
+</p:sld>
+</file>
+
+<file path=ppt/slides/slide9.xml><?xml version="1.0" encoding="utf-8"?>
+<p:sld xmlns:a="http://schemas.openxmlformats.org/drawingml/2006/main" xmlns:r="http://schemas.openxmlformats.org/officeDocument/2006/relationships" xmlns:p="http://schemas.openxmlformats.org/presentationml/2006/main">
+  <p:cSld>
+    <p:spTree>
+      <p:nvGrpSpPr>
+        <p:cNvPr id="1" name=""/>
+        <p:cNvGrpSpPr/>
+        <p:nvPr/>
+      </p:nvGrpSpPr>
+      <p:grpSpPr>
+        <a:xfrm>
+          <a:off x="0" y="0"/>
+          <a:ext cx="0" cy="0"/>
+          <a:chOff x="0" y="0"/>
+          <a:chExt cx="0" cy="0"/>
+        </a:xfrm>
+      </p:grpSpPr>
+      <p:sp>
+        <p:nvSpPr>
+          <p:cNvPr id="2" name="Title 1">
+            <a:extLst>
+              <a:ext uri="{FF2B5EF4-FFF2-40B4-BE49-F238E27FC236}">
+                <a16:creationId xmlns:a16="http://schemas.microsoft.com/office/drawing/2014/main" id="{4C91DFF3-1895-F54A-97A3-88ECAB70FE48}"/>
+              </a:ext>
+            </a:extLst>
+          </p:cNvPr>
+          <p:cNvSpPr>
+            <a:spLocks noGrp="1"/>
+          </p:cNvSpPr>
+          <p:nvPr>
+            <p:ph type="title"/>
+          </p:nvPr>
+        </p:nvSpPr>
+        <p:spPr>
+          <a:xfrm>
+            <a:off x="838200" y="365125"/>
+            <a:ext cx="5606845" cy="1325563"/>
+          </a:xfrm>
+        </p:spPr>
+        <p:txBody>
+          <a:bodyPr/>
+          <a:lstStyle/>
+          <a:p>
+            <a:r>
+              <a:rPr lang="en-US" dirty="0"/>
+              <a:t>Ongoing Development Topics</a:t>
+            </a:r>
+          </a:p>
+        </p:txBody>
+      </p:sp>
+      <p:sp>
+        <p:nvSpPr>
+          <p:cNvPr id="3" name="Content Placeholder 2">
+            <a:extLst>
+              <a:ext uri="{FF2B5EF4-FFF2-40B4-BE49-F238E27FC236}">
+                <a16:creationId xmlns:a16="http://schemas.microsoft.com/office/drawing/2014/main" id="{BEB21CF7-CB02-E046-A4D7-C126D78E90A7}"/>
+              </a:ext>
+            </a:extLst>
+          </p:cNvPr>
+          <p:cNvSpPr>
+            <a:spLocks noGrp="1"/>
+          </p:cNvSpPr>
+          <p:nvPr>
+            <p:ph idx="1"/>
+          </p:nvPr>
+        </p:nvSpPr>
+        <p:spPr>
+          <a:xfrm>
+            <a:off x="838200" y="1825625"/>
+            <a:ext cx="6167284" cy="4351338"/>
+          </a:xfrm>
+        </p:spPr>
+        <p:txBody>
+          <a:bodyPr>
+            <a:normAutofit/>
+          </a:bodyPr>
+          <a:lstStyle/>
+          <a:p>
+            <a:r>
+              <a:rPr lang="en-US" dirty="0"/>
+              <a:t>Handle computer resources effectively</a:t>
+            </a:r>
+          </a:p>
+          <a:p>
+            <a:r>
+              <a:rPr lang="en-US" dirty="0"/>
+              <a:t>Project the fisheye images to maps (e.g.  plot on the right)</a:t>
+            </a:r>
+          </a:p>
+          <a:p>
+            <a:r>
+              <a:rPr lang="en-US" dirty="0"/>
+              <a:t>Unify the </a:t>
+            </a:r>
+            <a:r>
+              <a:rPr lang="en-US" dirty="0" err="1"/>
+              <a:t>asilib</a:t>
+            </a:r>
+            <a:r>
+              <a:rPr lang="en-US" dirty="0"/>
+              <a:t> functionality into an </a:t>
+            </a:r>
+            <a:r>
+              <a:rPr lang="en-US" dirty="0" err="1"/>
+              <a:t>asilib.Imager</a:t>
+            </a:r>
+            <a:r>
+              <a:rPr lang="en-US" dirty="0"/>
+              <a:t>() class</a:t>
+            </a:r>
+          </a:p>
+          <a:p>
+            <a:r>
+              <a:rPr lang="en-US" dirty="0"/>
+              <a:t>Integrate with </a:t>
+            </a:r>
+            <a:r>
+              <a:rPr lang="en-US" dirty="0">
+                <a:hlinkClick r:id="rId2"/>
+              </a:rPr>
+              <a:t>Aurora X</a:t>
+            </a:r>
+            <a:r>
+              <a:rPr lang="en-US" dirty="0"/>
+              <a:t> </a:t>
+            </a:r>
+          </a:p>
+          <a:p>
+            <a:r>
+              <a:rPr lang="en-US" dirty="0"/>
+              <a:t>Update the documentation with more examples</a:t>
+            </a:r>
+          </a:p>
+          <a:p>
+            <a:r>
+              <a:rPr lang="en-US" dirty="0"/>
+              <a:t>And add other imager arrays as plugins</a:t>
+            </a:r>
+          </a:p>
+          <a:p>
+            <a:endParaRPr lang="en-US" dirty="0"/>
+          </a:p>
+        </p:txBody>
+      </p:sp>
+      <p:sp>
+        <p:nvSpPr>
+          <p:cNvPr id="4" name="Date Placeholder 3">
+            <a:extLst>
+              <a:ext uri="{FF2B5EF4-FFF2-40B4-BE49-F238E27FC236}">
+                <a16:creationId xmlns:a16="http://schemas.microsoft.com/office/drawing/2014/main" id="{68DBE26B-B940-9D41-91D2-A09AE128977E}"/>
+              </a:ext>
+            </a:extLst>
+          </p:cNvPr>
+          <p:cNvSpPr>
+            <a:spLocks noGrp="1"/>
+          </p:cNvSpPr>
+          <p:nvPr>
+            <p:ph type="dt" sz="half" idx="10"/>
+          </p:nvPr>
+        </p:nvSpPr>
+        <p:spPr/>
+        <p:txBody>
+          <a:bodyPr/>
+          <a:lstStyle/>
+          <a:p>
+            <a:r>
+              <a:rPr lang="en-US"/>
+              <a:t>21 June 2021</a:t>
+            </a:r>
+          </a:p>
+        </p:txBody>
+      </p:sp>
+      <p:sp>
+        <p:nvSpPr>
+          <p:cNvPr id="5" name="Footer Placeholder 4">
+            <a:extLst>
+              <a:ext uri="{FF2B5EF4-FFF2-40B4-BE49-F238E27FC236}">
+                <a16:creationId xmlns:a16="http://schemas.microsoft.com/office/drawing/2014/main" id="{C7576B1B-737E-A647-8502-03C312BDFCB5}"/>
+              </a:ext>
+            </a:extLst>
+          </p:cNvPr>
+          <p:cNvSpPr>
+            <a:spLocks noGrp="1"/>
+          </p:cNvSpPr>
+          <p:nvPr>
+            <p:ph type="ftr" sz="quarter" idx="11"/>
+          </p:nvPr>
+        </p:nvSpPr>
+        <p:spPr/>
+        <p:txBody>
+          <a:bodyPr/>
+          <a:lstStyle/>
+          <a:p>
+            <a:r>
+              <a:rPr lang="en-US"/>
+              <a:t>Mykhaylo (Mike) Shumko | aurora-asi-lib | 2021 CEDAR Workshop</a:t>
+            </a:r>
+          </a:p>
+        </p:txBody>
+      </p:sp>
+      <p:sp>
+        <p:nvSpPr>
+          <p:cNvPr id="6" name="Slide Number Placeholder 5">
+            <a:extLst>
+              <a:ext uri="{FF2B5EF4-FFF2-40B4-BE49-F238E27FC236}">
+                <a16:creationId xmlns:a16="http://schemas.microsoft.com/office/drawing/2014/main" id="{B36632C6-3C0E-FC42-A816-4A1A24BFAD86}"/>
+              </a:ext>
+            </a:extLst>
+          </p:cNvPr>
+          <p:cNvSpPr>
+            <a:spLocks noGrp="1"/>
+          </p:cNvSpPr>
+          <p:nvPr>
+            <p:ph type="sldNum" sz="quarter" idx="12"/>
+          </p:nvPr>
+        </p:nvSpPr>
+        <p:spPr/>
+        <p:txBody>
+          <a:bodyPr/>
+          <a:lstStyle/>
+          <a:p>
+            <a:fld id="{5FE5D21B-D093-CC4D-9CB2-6B9391E84221}" type="slidenum">
+              <a:rPr lang="en-US" smtClean="0"/>
+              <a:t>9</a:t>
+            </a:fld>
+            <a:endParaRPr lang="en-US"/>
+          </a:p>
+        </p:txBody>
+      </p:sp>
+      <p:pic>
+        <p:nvPicPr>
+          <p:cNvPr id="1026" name="Picture 2" descr="SVS: THEMIS/ASI Nights - High Resolution">
+            <a:extLst>
+              <a:ext uri="{FF2B5EF4-FFF2-40B4-BE49-F238E27FC236}">
+                <a16:creationId xmlns:a16="http://schemas.microsoft.com/office/drawing/2014/main" id="{9656CAF2-CC2C-D94D-B9DF-86FB146F5094}"/>
+              </a:ext>
+            </a:extLst>
+          </p:cNvPr>
+          <p:cNvPicPr>
+            <a:picLocks noChangeAspect="1" noChangeArrowheads="1"/>
+          </p:cNvPicPr>
+          <p:nvPr/>
+        </p:nvPicPr>
+        <p:blipFill rotWithShape="1">
+          <a:blip r:embed="rId3">
+            <a:extLst>
+              <a:ext uri="{28A0092B-C50C-407E-A947-70E740481C1C}">
+                <a14:useLocalDpi xmlns:a14="http://schemas.microsoft.com/office/drawing/2010/main" val="0"/>
+              </a:ext>
+            </a:extLst>
+          </a:blip>
+          <a:srcRect l="14920" t="7097" b="12473"/>
+          <a:stretch/>
+        </p:blipFill>
+        <p:spPr bwMode="auto">
+          <a:xfrm>
+            <a:off x="7005484" y="267263"/>
+            <a:ext cx="5186516" cy="2757949"/>
+          </a:xfrm>
+          <a:prstGeom prst="rect">
+            <a:avLst/>
+          </a:prstGeom>
+          <a:noFill/>
+          <a:extLst>
+            <a:ext uri="{909E8E84-426E-40DD-AFC4-6F175D3DCCD1}">
+              <a14:hiddenFill xmlns:a14="http://schemas.microsoft.com/office/drawing/2010/main">
+                <a:solidFill>
+                  <a:srgbClr val="FFFFFF"/>
+                </a:solidFill>
+              </a14:hiddenFill>
+            </a:ext>
+          </a:extLst>
+        </p:spPr>
+      </p:pic>
+      <p:sp>
+        <p:nvSpPr>
+          <p:cNvPr id="7" name="TextBox 6">
+            <a:extLst>
+              <a:ext uri="{FF2B5EF4-FFF2-40B4-BE49-F238E27FC236}">
+                <a16:creationId xmlns:a16="http://schemas.microsoft.com/office/drawing/2014/main" id="{08294DCD-8656-7548-8993-5EA8CC17704F}"/>
+              </a:ext>
+            </a:extLst>
+          </p:cNvPr>
+          <p:cNvSpPr txBox="1"/>
+          <p:nvPr/>
+        </p:nvSpPr>
+        <p:spPr>
+          <a:xfrm>
+            <a:off x="7462684" y="4001294"/>
+            <a:ext cx="4380271" cy="1631216"/>
+          </a:xfrm>
+          <a:prstGeom prst="rect">
+            <a:avLst/>
+          </a:prstGeom>
+          <a:noFill/>
+        </p:spPr>
+        <p:txBody>
+          <a:bodyPr wrap="square" rtlCol="0">
+            <a:spAutoFit/>
+          </a:bodyPr>
+          <a:lstStyle/>
+          <a:p>
+            <a:r>
+              <a:rPr lang="en-US" sz="2000" dirty="0"/>
+              <a:t>We need your help! Please contact me, </a:t>
+            </a:r>
+            <a:r>
+              <a:rPr lang="en-US" sz="2000" dirty="0">
+                <a:hlinkClick r:id="rId4"/>
+              </a:rPr>
+              <a:t>mykhaylo.shumko@nasa.gov</a:t>
+            </a:r>
+            <a:r>
+              <a:rPr lang="en-US" sz="2000" dirty="0"/>
+              <a:t> if you’d like to contribute or have ideas (I am always interested in ways to improve </a:t>
+            </a:r>
+            <a:r>
+              <a:rPr lang="en-US" sz="2000" dirty="0" err="1"/>
+              <a:t>asilib</a:t>
+            </a:r>
+            <a:r>
+              <a:rPr lang="en-US" sz="2000" dirty="0"/>
+              <a:t>)</a:t>
+            </a:r>
+          </a:p>
+        </p:txBody>
+      </p:sp>
+    </p:spTree>
+    <p:extLst>
+      <p:ext uri="{BB962C8B-B14F-4D97-AF65-F5344CB8AC3E}">
+        <p14:creationId xmlns:p14="http://schemas.microsoft.com/office/powerpoint/2010/main" val="2942081448"/>
       </p:ext>
     </p:extLst>
   </p:cSld>

</xml_diff>

<commit_message>
Updated presentation yet again.
</commit_message>
<xml_diff>
--- a/presentations/2021_cedar_shumko_asilib.pptx
+++ b/presentations/2021_cedar_shumko_asilib.pptx
@@ -6722,17 +6722,10 @@
           <a:p>
             <a:pPr lvl="1"/>
             <a:r>
-              <a:rPr lang="en-US" dirty="0"/>
-              <a:t>aurora-</a:t>
-            </a:r>
-            <a:r>
               <a:rPr lang="en-US" dirty="0" err="1"/>
-              <a:t>asi</a:t>
-            </a:r>
-            <a:r>
-              <a:rPr lang="en-US" dirty="0"/>
-              <a:t>-lib -&gt; Imager</a:t>
-            </a:r>
+              <a:t>asilib.Imager</a:t>
+            </a:r>
+            <a:endParaRPr lang="en-US" dirty="0"/>
           </a:p>
         </p:txBody>
       </p:sp>

</xml_diff>